<commit_message>
modif sur validation commande, en automatique
</commit_message>
<xml_diff>
--- a/Présentation Soutenance.pptx
+++ b/Présentation Soutenance.pptx
@@ -17,9 +17,8 @@
     <p:sldId id="266" r:id="rId11"/>
     <p:sldId id="267" r:id="rId12"/>
     <p:sldId id="268" r:id="rId13"/>
-    <p:sldId id="269" r:id="rId14"/>
-    <p:sldId id="260" r:id="rId15"/>
-    <p:sldId id="270" r:id="rId16"/>
+    <p:sldId id="260" r:id="rId14"/>
+    <p:sldId id="270" r:id="rId15"/>
   </p:sldIdLst>
   <p:sldSz cx="12192000" cy="6858000"/>
   <p:notesSz cx="6858000" cy="9144000"/>
@@ -118,6 +117,11 @@
       </a:defRPr>
     </a:lvl9pPr>
   </p:defaultTextStyle>
+  <p:extLst>
+    <p:ext uri="{EFAFB233-063F-42B5-8137-9DF3F51BA10A}">
+      <p15:sldGuideLst xmlns:p15="http://schemas.microsoft.com/office/powerpoint/2012/main"/>
+    </p:ext>
+  </p:extLst>
 </p:presentation>
 </file>
 
@@ -2656,6 +2660,13 @@
         </dgm:presLayoutVars>
       </dgm:prSet>
       <dgm:spPr/>
+      <dgm:t>
+        <a:bodyPr/>
+        <a:lstStyle/>
+        <a:p>
+          <a:endParaRPr lang="en-US"/>
+        </a:p>
+      </dgm:t>
     </dgm:pt>
     <dgm:pt modelId="{4911DC69-6C76-4E62-A518-F79ADC37B8A9}" type="pres">
       <dgm:prSet presAssocID="{FB0E7902-FAE1-4D79-9944-D7F27A22BE82}" presName="Name1" presStyleCnt="0"/>
@@ -2672,6 +2683,13 @@
     <dgm:pt modelId="{48E3538B-69CE-4E20-AF46-0BDDCC10AC92}" type="pres">
       <dgm:prSet presAssocID="{FB0E7902-FAE1-4D79-9944-D7F27A22BE82}" presName="conn" presStyleLbl="parChTrans1D2" presStyleIdx="0" presStyleCnt="1"/>
       <dgm:spPr/>
+      <dgm:t>
+        <a:bodyPr/>
+        <a:lstStyle/>
+        <a:p>
+          <a:endParaRPr lang="en-US"/>
+        </a:p>
+      </dgm:t>
     </dgm:pt>
     <dgm:pt modelId="{0092F9C4-B673-4673-8F5C-4835177A7BA9}" type="pres">
       <dgm:prSet presAssocID="{FB0E7902-FAE1-4D79-9944-D7F27A22BE82}" presName="extraNode" presStyleLbl="node1" presStyleIdx="0" presStyleCnt="7"/>
@@ -2688,6 +2706,13 @@
         </dgm:presLayoutVars>
       </dgm:prSet>
       <dgm:spPr/>
+      <dgm:t>
+        <a:bodyPr/>
+        <a:lstStyle/>
+        <a:p>
+          <a:endParaRPr lang="en-US"/>
+        </a:p>
+      </dgm:t>
     </dgm:pt>
     <dgm:pt modelId="{64933BA9-6BF4-46A4-86E9-259CFA32C8F3}" type="pres">
       <dgm:prSet presAssocID="{9514A20A-DF58-44C8-A0D3-F7C0DA49FC2E}" presName="accent_1" presStyleCnt="0"/>
@@ -2796,6 +2821,13 @@
         </dgm:presLayoutVars>
       </dgm:prSet>
       <dgm:spPr/>
+      <dgm:t>
+        <a:bodyPr/>
+        <a:lstStyle/>
+        <a:p>
+          <a:endParaRPr lang="en-US"/>
+        </a:p>
+      </dgm:t>
     </dgm:pt>
     <dgm:pt modelId="{B3445582-EE00-4343-8656-61C64D4608D3}" type="pres">
       <dgm:prSet presAssocID="{E980A5FF-11F6-427E-9EA1-941AE106754E}" presName="accent_6" presStyleCnt="0"/>
@@ -2812,6 +2844,13 @@
         </dgm:presLayoutVars>
       </dgm:prSet>
       <dgm:spPr/>
+      <dgm:t>
+        <a:bodyPr/>
+        <a:lstStyle/>
+        <a:p>
+          <a:endParaRPr lang="en-US"/>
+        </a:p>
+      </dgm:t>
     </dgm:pt>
     <dgm:pt modelId="{3F66559E-03C8-49CA-B279-8C9F3B9287EF}" type="pres">
       <dgm:prSet presAssocID="{BED8FA27-9D87-4879-AF97-9AD67F0B07B3}" presName="accent_7" presStyleCnt="0"/>
@@ -3085,6 +3124,13 @@
         </dgm:presLayoutVars>
       </dgm:prSet>
       <dgm:spPr/>
+      <dgm:t>
+        <a:bodyPr/>
+        <a:lstStyle/>
+        <a:p>
+          <a:endParaRPr lang="en-US"/>
+        </a:p>
+      </dgm:t>
     </dgm:pt>
     <dgm:pt modelId="{4911DC69-6C76-4E62-A518-F79ADC37B8A9}" type="pres">
       <dgm:prSet presAssocID="{FB0E7902-FAE1-4D79-9944-D7F27A22BE82}" presName="Name1" presStyleCnt="0"/>
@@ -3101,6 +3147,13 @@
     <dgm:pt modelId="{48E3538B-69CE-4E20-AF46-0BDDCC10AC92}" type="pres">
       <dgm:prSet presAssocID="{FB0E7902-FAE1-4D79-9944-D7F27A22BE82}" presName="conn" presStyleLbl="parChTrans1D2" presStyleIdx="0" presStyleCnt="1"/>
       <dgm:spPr/>
+      <dgm:t>
+        <a:bodyPr/>
+        <a:lstStyle/>
+        <a:p>
+          <a:endParaRPr lang="en-US"/>
+        </a:p>
+      </dgm:t>
     </dgm:pt>
     <dgm:pt modelId="{0092F9C4-B673-4673-8F5C-4835177A7BA9}" type="pres">
       <dgm:prSet presAssocID="{FB0E7902-FAE1-4D79-9944-D7F27A22BE82}" presName="extraNode" presStyleLbl="node1" presStyleIdx="0" presStyleCnt="5"/>
@@ -3227,18 +3280,18 @@
     </dgm:pt>
   </dgm:ptLst>
   <dgm:cxnLst>
+    <dgm:cxn modelId="{2B143F8A-A834-4D4B-A962-41F1514DB7B6}" srcId="{FB0E7902-FAE1-4D79-9944-D7F27A22BE82}" destId="{1C6CC226-B911-4953-B2F6-0D1637E2674A}" srcOrd="2" destOrd="0" parTransId="{05306B17-80BA-4080-8B6F-3542C80C93B2}" sibTransId="{5D1474B0-4E02-4778-A848-672A685B137B}"/>
+    <dgm:cxn modelId="{FDBB796D-C16B-49A6-B40A-17EFB76580B7}" srcId="{FB0E7902-FAE1-4D79-9944-D7F27A22BE82}" destId="{893B1A32-D65F-4168-867A-F9E40E45D908}" srcOrd="3" destOrd="0" parTransId="{C394D7D4-F643-4D1D-A6DD-0774642B1EED}" sibTransId="{BAB70C46-59C9-478D-BBCA-183DCDF56173}"/>
+    <dgm:cxn modelId="{0A21073E-1110-42D1-B7D2-F9DA6E1EBFE3}" srcId="{FB0E7902-FAE1-4D79-9944-D7F27A22BE82}" destId="{D938042B-4DFC-41E9-B33D-0D402F1D58E7}" srcOrd="1" destOrd="0" parTransId="{54A0EC9B-C406-4C8B-B779-D60BAF4CE835}" sibTransId="{2ECFE84C-4F97-4047-842A-6D4A9A65159F}"/>
+    <dgm:cxn modelId="{75BB75B4-2D67-4ECE-8423-6C4A70E7125F}" type="presOf" srcId="{FB0E7902-FAE1-4D79-9944-D7F27A22BE82}" destId="{9F8C6030-1285-4A00-BB72-8419D18701AA}" srcOrd="0" destOrd="0" presId="urn:microsoft.com/office/officeart/2008/layout/VerticalCurvedList"/>
+    <dgm:cxn modelId="{53D40AA2-6DC8-4C76-B9D5-9E40FFD74AF6}" type="presOf" srcId="{9514A20A-DF58-44C8-A0D3-F7C0DA49FC2E}" destId="{DC5B6CCB-93AC-468A-BA13-52913FA0AB6D}" srcOrd="0" destOrd="0" presId="urn:microsoft.com/office/officeart/2008/layout/VerticalCurvedList"/>
+    <dgm:cxn modelId="{5EF05B2E-53AD-4BFE-9995-9257C01B1137}" srcId="{FB0E7902-FAE1-4D79-9944-D7F27A22BE82}" destId="{9514A20A-DF58-44C8-A0D3-F7C0DA49FC2E}" srcOrd="0" destOrd="0" parTransId="{FBB440D0-C089-4C23-A375-4DDABE83B308}" sibTransId="{344C2BED-CDE1-4597-92B5-AC3E3800568F}"/>
+    <dgm:cxn modelId="{DBFC9600-74F4-4854-8687-930204275D97}" type="presOf" srcId="{D938042B-4DFC-41E9-B33D-0D402F1D58E7}" destId="{A77AD75E-5BB0-41F3-BFB9-A29794099328}" srcOrd="0" destOrd="0" presId="urn:microsoft.com/office/officeart/2008/layout/VerticalCurvedList"/>
+    <dgm:cxn modelId="{2E904687-250A-4ED7-B026-AC1E54C6F814}" type="presOf" srcId="{344C2BED-CDE1-4597-92B5-AC3E3800568F}" destId="{48E3538B-69CE-4E20-AF46-0BDDCC10AC92}" srcOrd="0" destOrd="0" presId="urn:microsoft.com/office/officeart/2008/layout/VerticalCurvedList"/>
+    <dgm:cxn modelId="{64467B45-1235-46A4-99B2-A8E018639EFD}" type="presOf" srcId="{CC9DB482-1878-4567-BA4D-5F587A39BB27}" destId="{721B7006-79C5-40B7-BA3F-A3763AEF4C0A}" srcOrd="0" destOrd="0" presId="urn:microsoft.com/office/officeart/2008/layout/VerticalCurvedList"/>
+    <dgm:cxn modelId="{80B642FA-548B-46FF-9DE1-13B706DC389D}" type="presOf" srcId="{893B1A32-D65F-4168-867A-F9E40E45D908}" destId="{D8C6C63B-59DA-45B9-95D0-599BAEA05A41}" srcOrd="0" destOrd="0" presId="urn:microsoft.com/office/officeart/2008/layout/VerticalCurvedList"/>
     <dgm:cxn modelId="{289BA114-65E3-4E97-8763-4AA7B4513A3F}" srcId="{FB0E7902-FAE1-4D79-9944-D7F27A22BE82}" destId="{CC9DB482-1878-4567-BA4D-5F587A39BB27}" srcOrd="4" destOrd="0" parTransId="{2816DEDF-F567-45C1-94AA-8AC6332459F2}" sibTransId="{14A74CF3-82EA-4B78-B478-080E75F10D30}"/>
-    <dgm:cxn modelId="{2B143F8A-A834-4D4B-A962-41F1514DB7B6}" srcId="{FB0E7902-FAE1-4D79-9944-D7F27A22BE82}" destId="{1C6CC226-B911-4953-B2F6-0D1637E2674A}" srcOrd="2" destOrd="0" parTransId="{05306B17-80BA-4080-8B6F-3542C80C93B2}" sibTransId="{5D1474B0-4E02-4778-A848-672A685B137B}"/>
-    <dgm:cxn modelId="{53D40AA2-6DC8-4C76-B9D5-9E40FFD74AF6}" type="presOf" srcId="{9514A20A-DF58-44C8-A0D3-F7C0DA49FC2E}" destId="{DC5B6CCB-93AC-468A-BA13-52913FA0AB6D}" srcOrd="0" destOrd="0" presId="urn:microsoft.com/office/officeart/2008/layout/VerticalCurvedList"/>
-    <dgm:cxn modelId="{64467B45-1235-46A4-99B2-A8E018639EFD}" type="presOf" srcId="{CC9DB482-1878-4567-BA4D-5F587A39BB27}" destId="{721B7006-79C5-40B7-BA3F-A3763AEF4C0A}" srcOrd="0" destOrd="0" presId="urn:microsoft.com/office/officeart/2008/layout/VerticalCurvedList"/>
     <dgm:cxn modelId="{33B96222-4AF8-4FBE-B0FF-BF463A84FEFB}" type="presOf" srcId="{1C6CC226-B911-4953-B2F6-0D1637E2674A}" destId="{C1549E34-19E6-44E7-BFA7-7172C1E7E170}" srcOrd="0" destOrd="0" presId="urn:microsoft.com/office/officeart/2008/layout/VerticalCurvedList"/>
-    <dgm:cxn modelId="{FDBB796D-C16B-49A6-B40A-17EFB76580B7}" srcId="{FB0E7902-FAE1-4D79-9944-D7F27A22BE82}" destId="{893B1A32-D65F-4168-867A-F9E40E45D908}" srcOrd="3" destOrd="0" parTransId="{C394D7D4-F643-4D1D-A6DD-0774642B1EED}" sibTransId="{BAB70C46-59C9-478D-BBCA-183DCDF56173}"/>
-    <dgm:cxn modelId="{DBFC9600-74F4-4854-8687-930204275D97}" type="presOf" srcId="{D938042B-4DFC-41E9-B33D-0D402F1D58E7}" destId="{A77AD75E-5BB0-41F3-BFB9-A29794099328}" srcOrd="0" destOrd="0" presId="urn:microsoft.com/office/officeart/2008/layout/VerticalCurvedList"/>
-    <dgm:cxn modelId="{0A21073E-1110-42D1-B7D2-F9DA6E1EBFE3}" srcId="{FB0E7902-FAE1-4D79-9944-D7F27A22BE82}" destId="{D938042B-4DFC-41E9-B33D-0D402F1D58E7}" srcOrd="1" destOrd="0" parTransId="{54A0EC9B-C406-4C8B-B779-D60BAF4CE835}" sibTransId="{2ECFE84C-4F97-4047-842A-6D4A9A65159F}"/>
-    <dgm:cxn modelId="{5EF05B2E-53AD-4BFE-9995-9257C01B1137}" srcId="{FB0E7902-FAE1-4D79-9944-D7F27A22BE82}" destId="{9514A20A-DF58-44C8-A0D3-F7C0DA49FC2E}" srcOrd="0" destOrd="0" parTransId="{FBB440D0-C089-4C23-A375-4DDABE83B308}" sibTransId="{344C2BED-CDE1-4597-92B5-AC3E3800568F}"/>
-    <dgm:cxn modelId="{80B642FA-548B-46FF-9DE1-13B706DC389D}" type="presOf" srcId="{893B1A32-D65F-4168-867A-F9E40E45D908}" destId="{D8C6C63B-59DA-45B9-95D0-599BAEA05A41}" srcOrd="0" destOrd="0" presId="urn:microsoft.com/office/officeart/2008/layout/VerticalCurvedList"/>
-    <dgm:cxn modelId="{75BB75B4-2D67-4ECE-8423-6C4A70E7125F}" type="presOf" srcId="{FB0E7902-FAE1-4D79-9944-D7F27A22BE82}" destId="{9F8C6030-1285-4A00-BB72-8419D18701AA}" srcOrd="0" destOrd="0" presId="urn:microsoft.com/office/officeart/2008/layout/VerticalCurvedList"/>
-    <dgm:cxn modelId="{2E904687-250A-4ED7-B026-AC1E54C6F814}" type="presOf" srcId="{344C2BED-CDE1-4597-92B5-AC3E3800568F}" destId="{48E3538B-69CE-4E20-AF46-0BDDCC10AC92}" srcOrd="0" destOrd="0" presId="urn:microsoft.com/office/officeart/2008/layout/VerticalCurvedList"/>
     <dgm:cxn modelId="{E5C97E7B-AD12-42A3-B1E2-225680CDF537}" type="presParOf" srcId="{9F8C6030-1285-4A00-BB72-8419D18701AA}" destId="{4911DC69-6C76-4E62-A518-F79ADC37B8A9}" srcOrd="0" destOrd="0" presId="urn:microsoft.com/office/officeart/2008/layout/VerticalCurvedList"/>
     <dgm:cxn modelId="{A18B9AFB-7785-42D1-8855-6CABB2F8D37A}" type="presParOf" srcId="{4911DC69-6C76-4E62-A518-F79ADC37B8A9}" destId="{FFB5EA80-F6CC-4FD1-B194-77B45BB89EA3}" srcOrd="0" destOrd="0" presId="urn:microsoft.com/office/officeart/2008/layout/VerticalCurvedList"/>
     <dgm:cxn modelId="{FA6FFD80-A2E6-4C1F-BC65-17DD07D4C9A8}" type="presParOf" srcId="{FFB5EA80-F6CC-4FD1-B194-77B45BB89EA3}" destId="{7F715AF5-32D0-4F03-800A-25A8B95D031E}" srcOrd="0" destOrd="0" presId="urn:microsoft.com/office/officeart/2008/layout/VerticalCurvedList"/>
@@ -3331,7 +3384,7 @@
         <a:p>
           <a:r>
             <a:rPr lang="fr-FR" sz="2400" dirty="0" smtClean="0"/>
-            <a:t>Stocks dynamiques</a:t>
+            <a:t>Validation manuelle commande</a:t>
           </a:r>
           <a:endParaRPr lang="en-US" sz="2400" dirty="0"/>
         </a:p>
@@ -3368,7 +3421,7 @@
         <a:p>
           <a:r>
             <a:rPr lang="fr-FR" sz="2000" dirty="0" smtClean="0"/>
-            <a:t>Une gestion des stocks dynamiques: moins d’attente pour le client et meilleure visibilité pour vous, mais bloque une évolution vers la gestion de commandes à la volée, et possibles </a:t>
+            <a:t>Un serveur valide les commandes avant ou après la phase d’empreinte bancaire. Peut ralentir le fonctionnement mais permettre de gérer des cas atypiques : </a:t>
           </a:r>
           <a:r>
             <a:rPr lang="fr-FR" sz="2000" dirty="0" err="1" smtClean="0"/>
@@ -3376,7 +3429,7 @@
           </a:r>
           <a:r>
             <a:rPr lang="fr-FR" sz="2000" dirty="0" smtClean="0"/>
-            <a:t> cases</a:t>
+            <a:t> cases.</a:t>
           </a:r>
           <a:endParaRPr lang="en-US" sz="2000" dirty="0"/>
         </a:p>
@@ -3637,6 +3690,13 @@
         </dgm:presLayoutVars>
       </dgm:prSet>
       <dgm:spPr/>
+      <dgm:t>
+        <a:bodyPr/>
+        <a:lstStyle/>
+        <a:p>
+          <a:endParaRPr lang="en-US"/>
+        </a:p>
+      </dgm:t>
     </dgm:pt>
     <dgm:pt modelId="{45CD99C4-605A-44C3-95D0-D445557C9149}" type="pres">
       <dgm:prSet presAssocID="{4D153DF5-A15F-42DF-B997-6BE70AEA65E0}" presName="composite" presStyleCnt="0"/>
@@ -3651,6 +3711,13 @@
         </dgm:presLayoutVars>
       </dgm:prSet>
       <dgm:spPr/>
+      <dgm:t>
+        <a:bodyPr/>
+        <a:lstStyle/>
+        <a:p>
+          <a:endParaRPr lang="en-US"/>
+        </a:p>
+      </dgm:t>
     </dgm:pt>
     <dgm:pt modelId="{901C593D-5389-4826-A74B-7BDC8336B2A3}" type="pres">
       <dgm:prSet presAssocID="{4D153DF5-A15F-42DF-B997-6BE70AEA65E0}" presName="Parent" presStyleLbl="alignNode1" presStyleIdx="0" presStyleCnt="3" custLinFactNeighborX="-35780" custLinFactNeighborY="-52693">
@@ -3661,6 +3728,13 @@
         </dgm:presLayoutVars>
       </dgm:prSet>
       <dgm:spPr/>
+      <dgm:t>
+        <a:bodyPr/>
+        <a:lstStyle/>
+        <a:p>
+          <a:endParaRPr lang="en-US"/>
+        </a:p>
+      </dgm:t>
     </dgm:pt>
     <dgm:pt modelId="{497EB933-4388-4D16-9696-836CAD959498}" type="pres">
       <dgm:prSet presAssocID="{4D153DF5-A15F-42DF-B997-6BE70AEA65E0}" presName="Accent" presStyleLbl="parChTrans1D1" presStyleIdx="0" presStyleCnt="3"/>
@@ -3700,6 +3774,13 @@
         </dgm:presLayoutVars>
       </dgm:prSet>
       <dgm:spPr/>
+      <dgm:t>
+        <a:bodyPr/>
+        <a:lstStyle/>
+        <a:p>
+          <a:endParaRPr lang="en-US"/>
+        </a:p>
+      </dgm:t>
     </dgm:pt>
     <dgm:pt modelId="{86C025F3-CA5D-4CC0-AF64-F07BB8DB41CA}" type="pres">
       <dgm:prSet presAssocID="{110830A2-ED30-4105-B7DE-F104A3592A56}" presName="Parent" presStyleLbl="alignNode1" presStyleIdx="1" presStyleCnt="3">
@@ -3710,6 +3791,13 @@
         </dgm:presLayoutVars>
       </dgm:prSet>
       <dgm:spPr/>
+      <dgm:t>
+        <a:bodyPr/>
+        <a:lstStyle/>
+        <a:p>
+          <a:endParaRPr lang="en-US"/>
+        </a:p>
+      </dgm:t>
     </dgm:pt>
     <dgm:pt modelId="{10E35061-A190-4B3C-95E8-FEDED8FE2982}" type="pres">
       <dgm:prSet presAssocID="{110830A2-ED30-4105-B7DE-F104A3592A56}" presName="Accent" presStyleLbl="parChTrans1D1" presStyleIdx="1" presStyleCnt="3"/>
@@ -3749,6 +3837,13 @@
         </dgm:presLayoutVars>
       </dgm:prSet>
       <dgm:spPr/>
+      <dgm:t>
+        <a:bodyPr/>
+        <a:lstStyle/>
+        <a:p>
+          <a:endParaRPr lang="en-US"/>
+        </a:p>
+      </dgm:t>
     </dgm:pt>
     <dgm:pt modelId="{5FD00534-7AED-4A10-83EF-4A9E7011670F}" type="pres">
       <dgm:prSet presAssocID="{B2E3F4E9-5FE5-4D3B-8D81-C284DC96DAFB}" presName="Parent" presStyleLbl="alignNode1" presStyleIdx="2" presStyleCnt="3">
@@ -3759,6 +3854,13 @@
         </dgm:presLayoutVars>
       </dgm:prSet>
       <dgm:spPr/>
+      <dgm:t>
+        <a:bodyPr/>
+        <a:lstStyle/>
+        <a:p>
+          <a:endParaRPr lang="en-US"/>
+        </a:p>
+      </dgm:t>
     </dgm:pt>
     <dgm:pt modelId="{007C4BA7-5A21-476A-9AB0-8F1EAA7C8194}" type="pres">
       <dgm:prSet presAssocID="{B2E3F4E9-5FE5-4D3B-8D81-C284DC96DAFB}" presName="Accent" presStyleLbl="parChTrans1D1" presStyleIdx="2" presStyleCnt="3"/>
@@ -3797,8 +3899,8 @@
     <dgm:cxn modelId="{6DB06F1B-9A56-4A66-AE9F-6CCCB9CD94FE}" type="presOf" srcId="{926E1694-563C-4800-BB78-E48089161BF7}" destId="{B68F0E29-EE6C-4A60-8838-BBB658CBBF98}" srcOrd="0" destOrd="0" presId="urn:microsoft.com/office/officeart/2011/layout/TabList"/>
     <dgm:cxn modelId="{44A43616-2F3F-48DE-BA5A-C9CDBDC3D7D5}" type="presOf" srcId="{38BFF6D8-1C5F-4E44-9773-7E34287246B4}" destId="{2C9B1F57-0EE4-468A-8764-A4904DA55F09}" srcOrd="0" destOrd="0" presId="urn:microsoft.com/office/officeart/2011/layout/TabList"/>
     <dgm:cxn modelId="{5A7307D8-F13F-420C-A454-078C2B8F1626}" srcId="{B2E3F4E9-5FE5-4D3B-8D81-C284DC96DAFB}" destId="{9DABA98A-0C07-4188-BA7E-64CE6152E0C9}" srcOrd="0" destOrd="0" parTransId="{F5F63BEA-00BF-4265-9C4D-3F91409AB961}" sibTransId="{1D51D3BD-B7E8-4BB1-BFD8-C5426E647D11}"/>
+    <dgm:cxn modelId="{349321B5-413A-47C5-940A-6254BEE53B02}" type="presOf" srcId="{110830A2-ED30-4105-B7DE-F104A3592A56}" destId="{86C025F3-CA5D-4CC0-AF64-F07BB8DB41CA}" srcOrd="0" destOrd="0" presId="urn:microsoft.com/office/officeart/2011/layout/TabList"/>
     <dgm:cxn modelId="{EF85E237-4DA6-4E0D-9933-A8CBA5678B59}" srcId="{926E1694-563C-4800-BB78-E48089161BF7}" destId="{110830A2-ED30-4105-B7DE-F104A3592A56}" srcOrd="1" destOrd="0" parTransId="{6DF56F0A-3014-4243-BA81-1A30D90AEB43}" sibTransId="{23F53182-6394-4D13-9898-8A7145A0237C}"/>
-    <dgm:cxn modelId="{349321B5-413A-47C5-940A-6254BEE53B02}" type="presOf" srcId="{110830A2-ED30-4105-B7DE-F104A3592A56}" destId="{86C025F3-CA5D-4CC0-AF64-F07BB8DB41CA}" srcOrd="0" destOrd="0" presId="urn:microsoft.com/office/officeart/2011/layout/TabList"/>
     <dgm:cxn modelId="{94F12011-7D0C-4A36-8AA6-30829B41164B}" srcId="{926E1694-563C-4800-BB78-E48089161BF7}" destId="{4D153DF5-A15F-42DF-B997-6BE70AEA65E0}" srcOrd="0" destOrd="0" parTransId="{1B6AAF96-A881-438E-A18C-FFC8848F2997}" sibTransId="{11364F14-181A-4A9E-8711-7018B75A3926}"/>
     <dgm:cxn modelId="{D64DDE7A-161F-42FE-9214-162F70845362}" srcId="{B2E3F4E9-5FE5-4D3B-8D81-C284DC96DAFB}" destId="{38BFF6D8-1C5F-4E44-9773-7E34287246B4}" srcOrd="1" destOrd="0" parTransId="{0F6A77D9-4238-4221-BA3A-AE1E02CF5AA1}" sibTransId="{7055AD64-33A5-4D2F-8455-2EB06C0F0BB9}"/>
     <dgm:cxn modelId="{19C42D40-3F13-4627-BAA0-0BE9A7DCBA88}" type="presOf" srcId="{D5A73E50-2EAE-428B-9397-672551A4ED85}" destId="{9B2BD96F-5F2E-486B-8CD6-EF7119881765}" srcOrd="0" destOrd="0" presId="urn:microsoft.com/office/officeart/2011/layout/TabList"/>
@@ -5613,7 +5715,7 @@
           </a:pPr>
           <a:r>
             <a:rPr lang="fr-FR" sz="2400" kern="1200" dirty="0" smtClean="0"/>
-            <a:t>Stocks dynamiques</a:t>
+            <a:t>Validation manuelle commande</a:t>
           </a:r>
           <a:endParaRPr lang="en-US" sz="2400" kern="1200" dirty="0"/>
         </a:p>
@@ -5754,7 +5856,7 @@
           </a:pPr>
           <a:r>
             <a:rPr lang="fr-FR" sz="2000" kern="1200" dirty="0" smtClean="0"/>
-            <a:t>Une gestion des stocks dynamiques: moins d’attente pour le client et meilleure visibilité pour vous, mais bloque une évolution vers la gestion de commandes à la volée, et possibles </a:t>
+            <a:t>Un serveur valide les commandes avant ou après la phase d’empreinte bancaire. Peut ralentir le fonctionnement mais permettre de gérer des cas atypiques : </a:t>
           </a:r>
           <a:r>
             <a:rPr lang="fr-FR" sz="2000" kern="1200" dirty="0" err="1" smtClean="0"/>
@@ -5762,7 +5864,7 @@
           </a:r>
           <a:r>
             <a:rPr lang="fr-FR" sz="2000" kern="1200" dirty="0" smtClean="0"/>
-            <a:t> cases</a:t>
+            <a:t> cases.</a:t>
           </a:r>
           <a:endParaRPr lang="en-US" sz="2000" kern="1200" dirty="0"/>
         </a:p>
@@ -12194,7 +12296,7 @@
           <a:noFill/>
           <a:extLst>
             <a:ext uri="{909E8E84-426E-40dd-AFC4-6F175D3DCCD1}">
-              <a14:hiddenFill xmlns:a14="http://schemas.microsoft.com/office/drawing/2010/main" xmlns="">
+              <a14:hiddenFill xmlns="" xmlns:a14="http://schemas.microsoft.com/office/drawing/2010/main">
                 <a:solidFill>
                   <a:srgbClr val="FFFFFF"/>
                 </a:solidFill>
@@ -12254,7 +12356,7 @@
             </a:ln>
             <a:extLst>
               <a:ext uri="{91240B29-F687-4f45-9708-019B960494DF}">
-                <a14:hiddenLine xmlns:a14="http://schemas.microsoft.com/office/drawing/2010/main" xmlns="" w="9525">
+                <a14:hiddenLine xmlns="" xmlns:a14="http://schemas.microsoft.com/office/drawing/2010/main" w="9525">
                   <a:solidFill>
                     <a:srgbClr val="000000"/>
                   </a:solidFill>
@@ -12344,7 +12446,7 @@
             </a:ln>
             <a:extLst>
               <a:ext uri="{91240B29-F687-4f45-9708-019B960494DF}">
-                <a14:hiddenLine xmlns:a14="http://schemas.microsoft.com/office/drawing/2010/main" xmlns="" w="9525">
+                <a14:hiddenLine xmlns="" xmlns:a14="http://schemas.microsoft.com/office/drawing/2010/main" w="9525">
                   <a:solidFill>
                     <a:srgbClr val="000000"/>
                   </a:solidFill>
@@ -12434,7 +12536,7 @@
             </a:ln>
             <a:extLst>
               <a:ext uri="{91240B29-F687-4f45-9708-019B960494DF}">
-                <a14:hiddenLine xmlns:a14="http://schemas.microsoft.com/office/drawing/2010/main" xmlns="" w="9525">
+                <a14:hiddenLine xmlns="" xmlns:a14="http://schemas.microsoft.com/office/drawing/2010/main" w="9525">
                   <a:solidFill>
                     <a:srgbClr val="000000"/>
                   </a:solidFill>
@@ -12468,7 +12570,7 @@
             </a:ln>
             <a:extLst>
               <a:ext uri="{91240B29-F687-4f45-9708-019B960494DF}">
-                <a14:hiddenLine xmlns:a14="http://schemas.microsoft.com/office/drawing/2010/main" xmlns="" w="9525">
+                <a14:hiddenLine xmlns="" xmlns:a14="http://schemas.microsoft.com/office/drawing/2010/main" w="9525">
                   <a:solidFill>
                     <a:srgbClr val="000000"/>
                   </a:solidFill>
@@ -12558,7 +12660,7 @@
             </a:ln>
             <a:extLst>
               <a:ext uri="{91240B29-F687-4f45-9708-019B960494DF}">
-                <a14:hiddenLine xmlns:a14="http://schemas.microsoft.com/office/drawing/2010/main" xmlns="" w="9525">
+                <a14:hiddenLine xmlns="" xmlns:a14="http://schemas.microsoft.com/office/drawing/2010/main" w="9525">
                   <a:solidFill>
                     <a:srgbClr val="000000"/>
                   </a:solidFill>
@@ -12620,7 +12722,7 @@
             </a:ln>
             <a:extLst>
               <a:ext uri="{91240B29-F687-4f45-9708-019B960494DF}">
-                <a14:hiddenLine xmlns:a14="http://schemas.microsoft.com/office/drawing/2010/main" xmlns="" w="9525">
+                <a14:hiddenLine xmlns="" xmlns:a14="http://schemas.microsoft.com/office/drawing/2010/main" w="9525">
                   <a:solidFill>
                     <a:srgbClr val="000000"/>
                   </a:solidFill>
@@ -12682,7 +12784,7 @@
             </a:ln>
             <a:extLst>
               <a:ext uri="{91240B29-F687-4f45-9708-019B960494DF}">
-                <a14:hiddenLine xmlns:a14="http://schemas.microsoft.com/office/drawing/2010/main" xmlns="" w="9525">
+                <a14:hiddenLine xmlns="" xmlns:a14="http://schemas.microsoft.com/office/drawing/2010/main" w="9525">
                   <a:solidFill>
                     <a:srgbClr val="000000"/>
                   </a:solidFill>
@@ -12772,7 +12874,7 @@
             </a:ln>
             <a:extLst>
               <a:ext uri="{91240B29-F687-4f45-9708-019B960494DF}">
-                <a14:hiddenLine xmlns:a14="http://schemas.microsoft.com/office/drawing/2010/main" xmlns="" w="9525">
+                <a14:hiddenLine xmlns="" xmlns:a14="http://schemas.microsoft.com/office/drawing/2010/main" w="9525">
                   <a:solidFill>
                     <a:srgbClr val="000000"/>
                   </a:solidFill>
@@ -12834,7 +12936,7 @@
             </a:ln>
             <a:extLst>
               <a:ext uri="{91240B29-F687-4f45-9708-019B960494DF}">
-                <a14:hiddenLine xmlns:a14="http://schemas.microsoft.com/office/drawing/2010/main" xmlns="" w="9525">
+                <a14:hiddenLine xmlns="" xmlns:a14="http://schemas.microsoft.com/office/drawing/2010/main" w="9525">
                   <a:solidFill>
                     <a:srgbClr val="000000"/>
                   </a:solidFill>
@@ -12896,7 +12998,7 @@
             </a:ln>
             <a:extLst>
               <a:ext uri="{91240B29-F687-4f45-9708-019B960494DF}">
-                <a14:hiddenLine xmlns:a14="http://schemas.microsoft.com/office/drawing/2010/main" xmlns="" w="9525">
+                <a14:hiddenLine xmlns="" xmlns:a14="http://schemas.microsoft.com/office/drawing/2010/main" w="9525">
                   <a:solidFill>
                     <a:srgbClr val="000000"/>
                   </a:solidFill>
@@ -12986,7 +13088,7 @@
             </a:ln>
             <a:extLst>
               <a:ext uri="{91240B29-F687-4f45-9708-019B960494DF}">
-                <a14:hiddenLine xmlns:a14="http://schemas.microsoft.com/office/drawing/2010/main" xmlns="" w="9525">
+                <a14:hiddenLine xmlns="" xmlns:a14="http://schemas.microsoft.com/office/drawing/2010/main" w="9525">
                   <a:solidFill>
                     <a:srgbClr val="000000"/>
                   </a:solidFill>
@@ -13076,7 +13178,7 @@
             </a:ln>
             <a:extLst>
               <a:ext uri="{91240B29-F687-4f45-9708-019B960494DF}">
-                <a14:hiddenLine xmlns:a14="http://schemas.microsoft.com/office/drawing/2010/main" xmlns="" w="9525">
+                <a14:hiddenLine xmlns="" xmlns:a14="http://schemas.microsoft.com/office/drawing/2010/main" w="9525">
                   <a:solidFill>
                     <a:srgbClr val="000000"/>
                   </a:solidFill>
@@ -13138,7 +13240,7 @@
             </a:ln>
             <a:extLst>
               <a:ext uri="{91240B29-F687-4f45-9708-019B960494DF}">
-                <a14:hiddenLine xmlns:a14="http://schemas.microsoft.com/office/drawing/2010/main" xmlns="" w="9525">
+                <a14:hiddenLine xmlns="" xmlns:a14="http://schemas.microsoft.com/office/drawing/2010/main" w="9525">
                   <a:solidFill>
                     <a:srgbClr val="000000"/>
                   </a:solidFill>
@@ -13248,7 +13350,7 @@
             </a:ln>
             <a:extLst>
               <a:ext uri="{91240B29-F687-4f45-9708-019B960494DF}">
-                <a14:hiddenLine xmlns:a14="http://schemas.microsoft.com/office/drawing/2010/main" xmlns="" w="9525">
+                <a14:hiddenLine xmlns="" xmlns:a14="http://schemas.microsoft.com/office/drawing/2010/main" w="9525">
                   <a:solidFill>
                     <a:srgbClr val="000000"/>
                   </a:solidFill>
@@ -13310,7 +13412,7 @@
             </a:ln>
             <a:extLst>
               <a:ext uri="{91240B29-F687-4f45-9708-019B960494DF}">
-                <a14:hiddenLine xmlns:a14="http://schemas.microsoft.com/office/drawing/2010/main" xmlns="" w="9525">
+                <a14:hiddenLine xmlns="" xmlns:a14="http://schemas.microsoft.com/office/drawing/2010/main" w="9525">
                   <a:solidFill>
                     <a:srgbClr val="000000"/>
                   </a:solidFill>
@@ -13400,7 +13502,7 @@
             </a:ln>
             <a:extLst>
               <a:ext uri="{91240B29-F687-4f45-9708-019B960494DF}">
-                <a14:hiddenLine xmlns:a14="http://schemas.microsoft.com/office/drawing/2010/main" xmlns="" w="9525">
+                <a14:hiddenLine xmlns="" xmlns:a14="http://schemas.microsoft.com/office/drawing/2010/main" w="9525">
                   <a:solidFill>
                     <a:srgbClr val="000000"/>
                   </a:solidFill>
@@ -13490,7 +13592,7 @@
             </a:ln>
             <a:extLst>
               <a:ext uri="{91240B29-F687-4f45-9708-019B960494DF}">
-                <a14:hiddenLine xmlns:a14="http://schemas.microsoft.com/office/drawing/2010/main" xmlns="" w="9525">
+                <a14:hiddenLine xmlns="" xmlns:a14="http://schemas.microsoft.com/office/drawing/2010/main" w="9525">
                   <a:solidFill>
                     <a:srgbClr val="000000"/>
                   </a:solidFill>
@@ -13552,7 +13654,7 @@
             </a:ln>
             <a:extLst>
               <a:ext uri="{91240B29-F687-4f45-9708-019B960494DF}">
-                <a14:hiddenLine xmlns:a14="http://schemas.microsoft.com/office/drawing/2010/main" xmlns="" w="9525">
+                <a14:hiddenLine xmlns="" xmlns:a14="http://schemas.microsoft.com/office/drawing/2010/main" w="9525">
                   <a:solidFill>
                     <a:srgbClr val="000000"/>
                   </a:solidFill>
@@ -13642,7 +13744,7 @@
             </a:ln>
             <a:extLst>
               <a:ext uri="{91240B29-F687-4f45-9708-019B960494DF}">
-                <a14:hiddenLine xmlns:a14="http://schemas.microsoft.com/office/drawing/2010/main" xmlns="" w="9525">
+                <a14:hiddenLine xmlns="" xmlns:a14="http://schemas.microsoft.com/office/drawing/2010/main" w="9525">
                   <a:solidFill>
                     <a:srgbClr val="000000"/>
                   </a:solidFill>
@@ -13732,7 +13834,7 @@
             </a:ln>
             <a:extLst>
               <a:ext uri="{91240B29-F687-4f45-9708-019B960494DF}">
-                <a14:hiddenLine xmlns:a14="http://schemas.microsoft.com/office/drawing/2010/main" xmlns="" w="9525">
+                <a14:hiddenLine xmlns="" xmlns:a14="http://schemas.microsoft.com/office/drawing/2010/main" w="9525">
                   <a:solidFill>
                     <a:srgbClr val="000000"/>
                   </a:solidFill>
@@ -13788,7 +13890,7 @@
             </a:ln>
             <a:extLst>
               <a:ext uri="{91240B29-F687-4f45-9708-019B960494DF}">
-                <a14:hiddenLine xmlns:a14="http://schemas.microsoft.com/office/drawing/2010/main" xmlns="" w="9525">
+                <a14:hiddenLine xmlns="" xmlns:a14="http://schemas.microsoft.com/office/drawing/2010/main" w="9525">
                   <a:solidFill>
                     <a:srgbClr val="000000"/>
                   </a:solidFill>
@@ -13878,7 +13980,7 @@
             </a:ln>
             <a:extLst>
               <a:ext uri="{91240B29-F687-4f45-9708-019B960494DF}">
-                <a14:hiddenLine xmlns:a14="http://schemas.microsoft.com/office/drawing/2010/main" xmlns="" w="9525">
+                <a14:hiddenLine xmlns="" xmlns:a14="http://schemas.microsoft.com/office/drawing/2010/main" w="9525">
                   <a:solidFill>
                     <a:srgbClr val="000000"/>
                   </a:solidFill>
@@ -13934,7 +14036,7 @@
             </a:ln>
             <a:extLst>
               <a:ext uri="{91240B29-F687-4f45-9708-019B960494DF}">
-                <a14:hiddenLine xmlns:a14="http://schemas.microsoft.com/office/drawing/2010/main" xmlns="" w="9525">
+                <a14:hiddenLine xmlns="" xmlns:a14="http://schemas.microsoft.com/office/drawing/2010/main" w="9525">
                   <a:solidFill>
                     <a:srgbClr val="000000"/>
                   </a:solidFill>
@@ -14024,7 +14126,7 @@
             </a:ln>
             <a:extLst>
               <a:ext uri="{91240B29-F687-4f45-9708-019B960494DF}">
-                <a14:hiddenLine xmlns:a14="http://schemas.microsoft.com/office/drawing/2010/main" xmlns="" w="9525">
+                <a14:hiddenLine xmlns="" xmlns:a14="http://schemas.microsoft.com/office/drawing/2010/main" w="9525">
                   <a:solidFill>
                     <a:srgbClr val="000000"/>
                   </a:solidFill>
@@ -14092,7 +14194,7 @@
             </a:ln>
             <a:extLst>
               <a:ext uri="{91240B29-F687-4f45-9708-019B960494DF}">
-                <a14:hiddenLine xmlns:a14="http://schemas.microsoft.com/office/drawing/2010/main" xmlns="" w="9525">
+                <a14:hiddenLine xmlns="" xmlns:a14="http://schemas.microsoft.com/office/drawing/2010/main" w="9525">
                   <a:solidFill>
                     <a:srgbClr val="000000"/>
                   </a:solidFill>
@@ -14182,7 +14284,7 @@
             </a:ln>
             <a:extLst>
               <a:ext uri="{91240B29-F687-4f45-9708-019B960494DF}">
-                <a14:hiddenLine xmlns:a14="http://schemas.microsoft.com/office/drawing/2010/main" xmlns="" w="9525">
+                <a14:hiddenLine xmlns="" xmlns:a14="http://schemas.microsoft.com/office/drawing/2010/main" w="9525">
                   <a:solidFill>
                     <a:srgbClr val="000000"/>
                   </a:solidFill>
@@ -14250,7 +14352,7 @@
             </a:ln>
             <a:extLst>
               <a:ext uri="{91240B29-F687-4f45-9708-019B960494DF}">
-                <a14:hiddenLine xmlns:a14="http://schemas.microsoft.com/office/drawing/2010/main" xmlns="" w="9525">
+                <a14:hiddenLine xmlns="" xmlns:a14="http://schemas.microsoft.com/office/drawing/2010/main" w="9525">
                   <a:solidFill>
                     <a:srgbClr val="000000"/>
                   </a:solidFill>
@@ -14340,7 +14442,7 @@
             </a:ln>
             <a:extLst>
               <a:ext uri="{91240B29-F687-4f45-9708-019B960494DF}">
-                <a14:hiddenLine xmlns:a14="http://schemas.microsoft.com/office/drawing/2010/main" xmlns="" w="9525">
+                <a14:hiddenLine xmlns="" xmlns:a14="http://schemas.microsoft.com/office/drawing/2010/main" w="9525">
                   <a:solidFill>
                     <a:srgbClr val="000000"/>
                   </a:solidFill>
@@ -14374,7 +14476,7 @@
             </a:ln>
             <a:extLst>
               <a:ext uri="{91240B29-F687-4f45-9708-019B960494DF}">
-                <a14:hiddenLine xmlns:a14="http://schemas.microsoft.com/office/drawing/2010/main" xmlns="" w="9525">
+                <a14:hiddenLine xmlns="" xmlns:a14="http://schemas.microsoft.com/office/drawing/2010/main" w="9525">
                   <a:solidFill>
                     <a:srgbClr val="000000"/>
                   </a:solidFill>
@@ -14464,7 +14566,7 @@
             </a:ln>
             <a:extLst>
               <a:ext uri="{91240B29-F687-4f45-9708-019B960494DF}">
-                <a14:hiddenLine xmlns:a14="http://schemas.microsoft.com/office/drawing/2010/main" xmlns="" w="9525">
+                <a14:hiddenLine xmlns="" xmlns:a14="http://schemas.microsoft.com/office/drawing/2010/main" w="9525">
                   <a:solidFill>
                     <a:srgbClr val="000000"/>
                   </a:solidFill>
@@ -14526,7 +14628,7 @@
             </a:ln>
             <a:extLst>
               <a:ext uri="{91240B29-F687-4f45-9708-019B960494DF}">
-                <a14:hiddenLine xmlns:a14="http://schemas.microsoft.com/office/drawing/2010/main" xmlns="" w="9525">
+                <a14:hiddenLine xmlns="" xmlns:a14="http://schemas.microsoft.com/office/drawing/2010/main" w="9525">
                   <a:solidFill>
                     <a:srgbClr val="000000"/>
                   </a:solidFill>
@@ -14588,7 +14690,7 @@
             </a:ln>
             <a:extLst>
               <a:ext uri="{91240B29-F687-4f45-9708-019B960494DF}">
-                <a14:hiddenLine xmlns:a14="http://schemas.microsoft.com/office/drawing/2010/main" xmlns="" w="9525">
+                <a14:hiddenLine xmlns="" xmlns:a14="http://schemas.microsoft.com/office/drawing/2010/main" w="9525">
                   <a:solidFill>
                     <a:srgbClr val="000000"/>
                   </a:solidFill>
@@ -14678,7 +14780,7 @@
             </a:ln>
             <a:extLst>
               <a:ext uri="{91240B29-F687-4f45-9708-019B960494DF}">
-                <a14:hiddenLine xmlns:a14="http://schemas.microsoft.com/office/drawing/2010/main" xmlns="" w="9525">
+                <a14:hiddenLine xmlns="" xmlns:a14="http://schemas.microsoft.com/office/drawing/2010/main" w="9525">
                   <a:solidFill>
                     <a:srgbClr val="000000"/>
                   </a:solidFill>
@@ -14746,7 +14848,7 @@
             </a:ln>
             <a:extLst>
               <a:ext uri="{91240B29-F687-4f45-9708-019B960494DF}">
-                <a14:hiddenLine xmlns:a14="http://schemas.microsoft.com/office/drawing/2010/main" xmlns="" w="9525">
+                <a14:hiddenLine xmlns="" xmlns:a14="http://schemas.microsoft.com/office/drawing/2010/main" w="9525">
                   <a:solidFill>
                     <a:srgbClr val="000000"/>
                   </a:solidFill>
@@ -14808,7 +14910,7 @@
             </a:ln>
             <a:extLst>
               <a:ext uri="{91240B29-F687-4f45-9708-019B960494DF}">
-                <a14:hiddenLine xmlns:a14="http://schemas.microsoft.com/office/drawing/2010/main" xmlns="" w="9525">
+                <a14:hiddenLine xmlns="" xmlns:a14="http://schemas.microsoft.com/office/drawing/2010/main" w="9525">
                   <a:solidFill>
                     <a:srgbClr val="000000"/>
                   </a:solidFill>
@@ -14898,7 +15000,7 @@
             </a:ln>
             <a:extLst>
               <a:ext uri="{91240B29-F687-4f45-9708-019B960494DF}">
-                <a14:hiddenLine xmlns:a14="http://schemas.microsoft.com/office/drawing/2010/main" xmlns="" w="9525">
+                <a14:hiddenLine xmlns="" xmlns:a14="http://schemas.microsoft.com/office/drawing/2010/main" w="9525">
                   <a:solidFill>
                     <a:srgbClr val="000000"/>
                   </a:solidFill>
@@ -14960,7 +15062,7 @@
             </a:ln>
             <a:extLst>
               <a:ext uri="{91240B29-F687-4f45-9708-019B960494DF}">
-                <a14:hiddenLine xmlns:a14="http://schemas.microsoft.com/office/drawing/2010/main" xmlns="" w="9525">
+                <a14:hiddenLine xmlns="" xmlns:a14="http://schemas.microsoft.com/office/drawing/2010/main" w="9525">
                   <a:solidFill>
                     <a:srgbClr val="000000"/>
                   </a:solidFill>
@@ -15050,7 +15152,7 @@
             </a:ln>
             <a:extLst>
               <a:ext uri="{91240B29-F687-4f45-9708-019B960494DF}">
-                <a14:hiddenLine xmlns:a14="http://schemas.microsoft.com/office/drawing/2010/main" xmlns="" w="9525">
+                <a14:hiddenLine xmlns="" xmlns:a14="http://schemas.microsoft.com/office/drawing/2010/main" w="9525">
                   <a:solidFill>
                     <a:srgbClr val="000000"/>
                   </a:solidFill>
@@ -15112,7 +15214,7 @@
             </a:ln>
             <a:extLst>
               <a:ext uri="{91240B29-F687-4f45-9708-019B960494DF}">
-                <a14:hiddenLine xmlns:a14="http://schemas.microsoft.com/office/drawing/2010/main" xmlns="" w="9525">
+                <a14:hiddenLine xmlns="" xmlns:a14="http://schemas.microsoft.com/office/drawing/2010/main" w="9525">
                   <a:solidFill>
                     <a:srgbClr val="000000"/>
                   </a:solidFill>
@@ -15202,7 +15304,7 @@
             </a:ln>
             <a:extLst>
               <a:ext uri="{91240B29-F687-4f45-9708-019B960494DF}">
-                <a14:hiddenLine xmlns:a14="http://schemas.microsoft.com/office/drawing/2010/main" xmlns="" w="9525">
+                <a14:hiddenLine xmlns="" xmlns:a14="http://schemas.microsoft.com/office/drawing/2010/main" w="9525">
                   <a:solidFill>
                     <a:srgbClr val="000000"/>
                   </a:solidFill>
@@ -15236,7 +15338,7 @@
             </a:ln>
             <a:extLst>
               <a:ext uri="{91240B29-F687-4f45-9708-019B960494DF}">
-                <a14:hiddenLine xmlns:a14="http://schemas.microsoft.com/office/drawing/2010/main" xmlns="" w="9525">
+                <a14:hiddenLine xmlns="" xmlns:a14="http://schemas.microsoft.com/office/drawing/2010/main" w="9525">
                   <a:solidFill>
                     <a:srgbClr val="000000"/>
                   </a:solidFill>
@@ -15301,7 +15403,7 @@
             </a:ln>
             <a:extLst>
               <a:ext uri="{91240B29-F687-4f45-9708-019B960494DF}">
-                <a14:hiddenLine xmlns:a14="http://schemas.microsoft.com/office/drawing/2010/main" xmlns="" w="9525">
+                <a14:hiddenLine xmlns="" xmlns:a14="http://schemas.microsoft.com/office/drawing/2010/main" w="9525">
                   <a:solidFill>
                     <a:srgbClr val="000000"/>
                   </a:solidFill>
@@ -15391,7 +15493,7 @@
             </a:ln>
             <a:extLst>
               <a:ext uri="{91240B29-F687-4f45-9708-019B960494DF}">
-                <a14:hiddenLine xmlns:a14="http://schemas.microsoft.com/office/drawing/2010/main" xmlns="" w="9525">
+                <a14:hiddenLine xmlns="" xmlns:a14="http://schemas.microsoft.com/office/drawing/2010/main" w="9525">
                   <a:solidFill>
                     <a:srgbClr val="000000"/>
                   </a:solidFill>
@@ -15453,7 +15555,7 @@
             </a:ln>
             <a:extLst>
               <a:ext uri="{91240B29-F687-4f45-9708-019B960494DF}">
-                <a14:hiddenLine xmlns:a14="http://schemas.microsoft.com/office/drawing/2010/main" xmlns="" w="9525">
+                <a14:hiddenLine xmlns="" xmlns:a14="http://schemas.microsoft.com/office/drawing/2010/main" w="9525">
                   <a:solidFill>
                     <a:srgbClr val="000000"/>
                   </a:solidFill>
@@ -15543,7 +15645,7 @@
             </a:ln>
             <a:extLst>
               <a:ext uri="{91240B29-F687-4f45-9708-019B960494DF}">
-                <a14:hiddenLine xmlns:a14="http://schemas.microsoft.com/office/drawing/2010/main" xmlns="" w="9525">
+                <a14:hiddenLine xmlns="" xmlns:a14="http://schemas.microsoft.com/office/drawing/2010/main" w="9525">
                   <a:solidFill>
                     <a:srgbClr val="000000"/>
                   </a:solidFill>
@@ -15633,7 +15735,7 @@
             </a:ln>
             <a:extLst>
               <a:ext uri="{91240B29-F687-4f45-9708-019B960494DF}">
-                <a14:hiddenLine xmlns:a14="http://schemas.microsoft.com/office/drawing/2010/main" xmlns="" w="9525">
+                <a14:hiddenLine xmlns="" xmlns:a14="http://schemas.microsoft.com/office/drawing/2010/main" w="9525">
                   <a:solidFill>
                     <a:srgbClr val="000000"/>
                   </a:solidFill>
@@ -15698,7 +15800,7 @@
             </a:ln>
             <a:extLst>
               <a:ext uri="{91240B29-F687-4f45-9708-019B960494DF}">
-                <a14:hiddenLine xmlns:a14="http://schemas.microsoft.com/office/drawing/2010/main" xmlns="" w="9525">
+                <a14:hiddenLine xmlns="" xmlns:a14="http://schemas.microsoft.com/office/drawing/2010/main" w="9525">
                   <a:solidFill>
                     <a:srgbClr val="000000"/>
                   </a:solidFill>
@@ -15760,7 +15862,7 @@
             </a:ln>
             <a:extLst>
               <a:ext uri="{91240B29-F687-4f45-9708-019B960494DF}">
-                <a14:hiddenLine xmlns:a14="http://schemas.microsoft.com/office/drawing/2010/main" xmlns="" w="9525">
+                <a14:hiddenLine xmlns="" xmlns:a14="http://schemas.microsoft.com/office/drawing/2010/main" w="9525">
                   <a:solidFill>
                     <a:srgbClr val="000000"/>
                   </a:solidFill>
@@ -15850,7 +15952,7 @@
             </a:ln>
             <a:extLst>
               <a:ext uri="{91240B29-F687-4f45-9708-019B960494DF}">
-                <a14:hiddenLine xmlns:a14="http://schemas.microsoft.com/office/drawing/2010/main" xmlns="" w="9525">
+                <a14:hiddenLine xmlns="" xmlns:a14="http://schemas.microsoft.com/office/drawing/2010/main" w="9525">
                   <a:solidFill>
                     <a:srgbClr val="000000"/>
                   </a:solidFill>
@@ -15940,7 +16042,7 @@
             </a:ln>
             <a:extLst>
               <a:ext uri="{91240B29-F687-4f45-9708-019B960494DF}">
-                <a14:hiddenLine xmlns:a14="http://schemas.microsoft.com/office/drawing/2010/main" xmlns="" w="9525">
+                <a14:hiddenLine xmlns="" xmlns:a14="http://schemas.microsoft.com/office/drawing/2010/main" w="9525">
                   <a:solidFill>
                     <a:srgbClr val="000000"/>
                   </a:solidFill>
@@ -16002,7 +16104,7 @@
             </a:ln>
             <a:extLst>
               <a:ext uri="{91240B29-F687-4f45-9708-019B960494DF}">
-                <a14:hiddenLine xmlns:a14="http://schemas.microsoft.com/office/drawing/2010/main" xmlns="" w="9525">
+                <a14:hiddenLine xmlns="" xmlns:a14="http://schemas.microsoft.com/office/drawing/2010/main" w="9525">
                   <a:solidFill>
                     <a:srgbClr val="000000"/>
                   </a:solidFill>
@@ -16122,7 +16224,7 @@
             </a:ln>
             <a:extLst>
               <a:ext uri="{91240B29-F687-4f45-9708-019B960494DF}">
-                <a14:hiddenLine xmlns:a14="http://schemas.microsoft.com/office/drawing/2010/main" xmlns="" w="9525">
+                <a14:hiddenLine xmlns="" xmlns:a14="http://schemas.microsoft.com/office/drawing/2010/main" w="9525">
                   <a:solidFill>
                     <a:srgbClr val="000000"/>
                   </a:solidFill>
@@ -16190,7 +16292,7 @@
             </a:ln>
             <a:extLst>
               <a:ext uri="{91240B29-F687-4f45-9708-019B960494DF}">
-                <a14:hiddenLine xmlns:a14="http://schemas.microsoft.com/office/drawing/2010/main" xmlns="" w="9525">
+                <a14:hiddenLine xmlns="" xmlns:a14="http://schemas.microsoft.com/office/drawing/2010/main" w="9525">
                   <a:solidFill>
                     <a:srgbClr val="000000"/>
                   </a:solidFill>
@@ -16280,7 +16382,7 @@
             </a:ln>
             <a:extLst>
               <a:ext uri="{91240B29-F687-4f45-9708-019B960494DF}">
-                <a14:hiddenLine xmlns:a14="http://schemas.microsoft.com/office/drawing/2010/main" xmlns="" w="9525">
+                <a14:hiddenLine xmlns="" xmlns:a14="http://schemas.microsoft.com/office/drawing/2010/main" w="9525">
                   <a:solidFill>
                     <a:srgbClr val="000000"/>
                   </a:solidFill>
@@ -16420,7 +16522,7 @@
           <a:p>
             <a:fld id="{47BEED4F-3508-41C8-AA26-4F41CCA804E1}" type="datetimeFigureOut">
               <a:rPr lang="en-US" smtClean="0"/>
-              <a:t>11/23/2018</a:t>
+              <a:t>11/30/2018</a:t>
             </a:fld>
             <a:endParaRPr lang="en-US"/>
           </a:p>
@@ -16687,7 +16789,7 @@
           <a:p>
             <a:fld id="{47BEED4F-3508-41C8-AA26-4F41CCA804E1}" type="datetimeFigureOut">
               <a:rPr lang="en-US" smtClean="0"/>
-              <a:t>11/23/2018</a:t>
+              <a:t>11/30/2018</a:t>
             </a:fld>
             <a:endParaRPr lang="en-US"/>
           </a:p>
@@ -16883,7 +16985,7 @@
           <a:p>
             <a:fld id="{47BEED4F-3508-41C8-AA26-4F41CCA804E1}" type="datetimeFigureOut">
               <a:rPr lang="en-US" smtClean="0"/>
-              <a:t>11/23/2018</a:t>
+              <a:t>11/30/2018</a:t>
             </a:fld>
             <a:endParaRPr lang="en-US"/>
           </a:p>
@@ -17146,7 +17248,7 @@
           <a:p>
             <a:fld id="{47BEED4F-3508-41C8-AA26-4F41CCA804E1}" type="datetimeFigureOut">
               <a:rPr lang="en-US" smtClean="0"/>
-              <a:t>11/23/2018</a:t>
+              <a:t>11/30/2018</a:t>
             </a:fld>
             <a:endParaRPr lang="en-US"/>
           </a:p>
@@ -17580,7 +17682,7 @@
           <a:p>
             <a:fld id="{47BEED4F-3508-41C8-AA26-4F41CCA804E1}" type="datetimeFigureOut">
               <a:rPr lang="en-US" smtClean="0"/>
-              <a:t>11/23/2018</a:t>
+              <a:t>11/30/2018</a:t>
             </a:fld>
             <a:endParaRPr lang="en-US"/>
           </a:p>
@@ -18126,7 +18228,7 @@
           <a:p>
             <a:fld id="{47BEED4F-3508-41C8-AA26-4F41CCA804E1}" type="datetimeFigureOut">
               <a:rPr lang="en-US" smtClean="0"/>
-              <a:t>11/23/2018</a:t>
+              <a:t>11/30/2018</a:t>
             </a:fld>
             <a:endParaRPr lang="en-US"/>
           </a:p>
@@ -18846,7 +18948,7 @@
           <a:p>
             <a:fld id="{47BEED4F-3508-41C8-AA26-4F41CCA804E1}" type="datetimeFigureOut">
               <a:rPr lang="en-US" smtClean="0"/>
-              <a:t>11/23/2018</a:t>
+              <a:t>11/30/2018</a:t>
             </a:fld>
             <a:endParaRPr lang="en-US"/>
           </a:p>
@@ -19016,7 +19118,7 @@
           <a:p>
             <a:fld id="{47BEED4F-3508-41C8-AA26-4F41CCA804E1}" type="datetimeFigureOut">
               <a:rPr lang="en-US" smtClean="0"/>
-              <a:t>11/23/2018</a:t>
+              <a:t>11/30/2018</a:t>
             </a:fld>
             <a:endParaRPr lang="en-US"/>
           </a:p>
@@ -19196,7 +19298,7 @@
           <a:p>
             <a:fld id="{47BEED4F-3508-41C8-AA26-4F41CCA804E1}" type="datetimeFigureOut">
               <a:rPr lang="en-US" smtClean="0"/>
-              <a:t>11/23/2018</a:t>
+              <a:t>11/30/2018</a:t>
             </a:fld>
             <a:endParaRPr lang="en-US"/>
           </a:p>
@@ -19366,7 +19468,7 @@
           <a:p>
             <a:fld id="{47BEED4F-3508-41C8-AA26-4F41CCA804E1}" type="datetimeFigureOut">
               <a:rPr lang="en-US" smtClean="0"/>
-              <a:t>11/23/2018</a:t>
+              <a:t>11/30/2018</a:t>
             </a:fld>
             <a:endParaRPr lang="en-US"/>
           </a:p>
@@ -19616,7 +19718,7 @@
           <a:p>
             <a:fld id="{47BEED4F-3508-41C8-AA26-4F41CCA804E1}" type="datetimeFigureOut">
               <a:rPr lang="en-US" smtClean="0"/>
-              <a:t>11/23/2018</a:t>
+              <a:t>11/30/2018</a:t>
             </a:fld>
             <a:endParaRPr lang="en-US"/>
           </a:p>
@@ -19848,7 +19950,7 @@
           <a:p>
             <a:fld id="{47BEED4F-3508-41C8-AA26-4F41CCA804E1}" type="datetimeFigureOut">
               <a:rPr lang="en-US" smtClean="0"/>
-              <a:t>11/23/2018</a:t>
+              <a:t>11/30/2018</a:t>
             </a:fld>
             <a:endParaRPr lang="en-US"/>
           </a:p>
@@ -20229,7 +20331,7 @@
           <a:p>
             <a:fld id="{47BEED4F-3508-41C8-AA26-4F41CCA804E1}" type="datetimeFigureOut">
               <a:rPr lang="en-US" smtClean="0"/>
-              <a:t>11/23/2018</a:t>
+              <a:t>11/30/2018</a:t>
             </a:fld>
             <a:endParaRPr lang="en-US"/>
           </a:p>
@@ -20347,7 +20449,7 @@
           <a:p>
             <a:fld id="{47BEED4F-3508-41C8-AA26-4F41CCA804E1}" type="datetimeFigureOut">
               <a:rPr lang="en-US" smtClean="0"/>
-              <a:t>11/23/2018</a:t>
+              <a:t>11/30/2018</a:t>
             </a:fld>
             <a:endParaRPr lang="en-US"/>
           </a:p>
@@ -20442,7 +20544,7 @@
           <a:p>
             <a:fld id="{47BEED4F-3508-41C8-AA26-4F41CCA804E1}" type="datetimeFigureOut">
               <a:rPr lang="en-US" smtClean="0"/>
-              <a:t>11/23/2018</a:t>
+              <a:t>11/30/2018</a:t>
             </a:fld>
             <a:endParaRPr lang="en-US"/>
           </a:p>
@@ -20691,7 +20793,7 @@
           <a:p>
             <a:fld id="{47BEED4F-3508-41C8-AA26-4F41CCA804E1}" type="datetimeFigureOut">
               <a:rPr lang="en-US" smtClean="0"/>
-              <a:t>11/23/2018</a:t>
+              <a:t>11/30/2018</a:t>
             </a:fld>
             <a:endParaRPr lang="en-US"/>
           </a:p>
@@ -20971,7 +21073,7 @@
           <a:p>
             <a:fld id="{47BEED4F-3508-41C8-AA26-4F41CCA804E1}" type="datetimeFigureOut">
               <a:rPr lang="en-US" smtClean="0"/>
-              <a:t>11/23/2018</a:t>
+              <a:t>11/30/2018</a:t>
             </a:fld>
             <a:endParaRPr lang="en-US"/>
           </a:p>
@@ -21087,7 +21189,7 @@
           <a:noFill/>
           <a:extLst>
             <a:ext uri="{909E8E84-426E-40dd-AFC4-6F175D3DCCD1}">
-              <a14:hiddenFill xmlns:a14="http://schemas.microsoft.com/office/drawing/2010/main" xmlns="">
+              <a14:hiddenFill xmlns="" xmlns:a14="http://schemas.microsoft.com/office/drawing/2010/main">
                 <a:solidFill>
                   <a:srgbClr val="FFFFFF"/>
                 </a:solidFill>
@@ -21161,7 +21263,7 @@
               </a:ln>
               <a:extLst>
                 <a:ext uri="{91240B29-F687-4f45-9708-019B960494DF}">
-                  <a14:hiddenLine xmlns:a14="http://schemas.microsoft.com/office/drawing/2010/main" xmlns="" w="9525">
+                  <a14:hiddenLine xmlns="" xmlns:a14="http://schemas.microsoft.com/office/drawing/2010/main" w="9525">
                     <a:solidFill>
                       <a:srgbClr val="000000"/>
                     </a:solidFill>
@@ -21251,7 +21353,7 @@
               </a:ln>
               <a:extLst>
                 <a:ext uri="{91240B29-F687-4f45-9708-019B960494DF}">
-                  <a14:hiddenLine xmlns:a14="http://schemas.microsoft.com/office/drawing/2010/main" xmlns="" w="9525">
+                  <a14:hiddenLine xmlns="" xmlns:a14="http://schemas.microsoft.com/office/drawing/2010/main" w="9525">
                     <a:solidFill>
                       <a:srgbClr val="000000"/>
                     </a:solidFill>
@@ -21341,7 +21443,7 @@
               </a:ln>
               <a:extLst>
                 <a:ext uri="{91240B29-F687-4f45-9708-019B960494DF}">
-                  <a14:hiddenLine xmlns:a14="http://schemas.microsoft.com/office/drawing/2010/main" xmlns="" w="9525">
+                  <a14:hiddenLine xmlns="" xmlns:a14="http://schemas.microsoft.com/office/drawing/2010/main" w="9525">
                     <a:solidFill>
                       <a:srgbClr val="000000"/>
                     </a:solidFill>
@@ -21403,7 +21505,7 @@
               </a:ln>
               <a:extLst>
                 <a:ext uri="{91240B29-F687-4f45-9708-019B960494DF}">
-                  <a14:hiddenLine xmlns:a14="http://schemas.microsoft.com/office/drawing/2010/main" xmlns="" w="9525">
+                  <a14:hiddenLine xmlns="" xmlns:a14="http://schemas.microsoft.com/office/drawing/2010/main" w="9525">
                     <a:solidFill>
                       <a:srgbClr val="000000"/>
                     </a:solidFill>
@@ -21493,7 +21595,7 @@
               </a:ln>
               <a:extLst>
                 <a:ext uri="{91240B29-F687-4f45-9708-019B960494DF}">
-                  <a14:hiddenLine xmlns:a14="http://schemas.microsoft.com/office/drawing/2010/main" xmlns="" w="9525">
+                  <a14:hiddenLine xmlns="" xmlns:a14="http://schemas.microsoft.com/office/drawing/2010/main" w="9525">
                     <a:solidFill>
                       <a:srgbClr val="000000"/>
                     </a:solidFill>
@@ -21555,7 +21657,7 @@
               </a:ln>
               <a:extLst>
                 <a:ext uri="{91240B29-F687-4f45-9708-019B960494DF}">
-                  <a14:hiddenLine xmlns:a14="http://schemas.microsoft.com/office/drawing/2010/main" xmlns="" w="9525">
+                  <a14:hiddenLine xmlns="" xmlns:a14="http://schemas.microsoft.com/office/drawing/2010/main" w="9525">
                     <a:solidFill>
                       <a:srgbClr val="000000"/>
                     </a:solidFill>
@@ -21617,7 +21719,7 @@
               </a:ln>
               <a:extLst>
                 <a:ext uri="{91240B29-F687-4f45-9708-019B960494DF}">
-                  <a14:hiddenLine xmlns:a14="http://schemas.microsoft.com/office/drawing/2010/main" xmlns="" w="9525">
+                  <a14:hiddenLine xmlns="" xmlns:a14="http://schemas.microsoft.com/office/drawing/2010/main" w="9525">
                     <a:solidFill>
                       <a:srgbClr val="000000"/>
                     </a:solidFill>
@@ -21707,7 +21809,7 @@
               </a:ln>
               <a:extLst>
                 <a:ext uri="{91240B29-F687-4f45-9708-019B960494DF}">
-                  <a14:hiddenLine xmlns:a14="http://schemas.microsoft.com/office/drawing/2010/main" xmlns="" w="9525">
+                  <a14:hiddenLine xmlns="" xmlns:a14="http://schemas.microsoft.com/office/drawing/2010/main" w="9525">
                     <a:solidFill>
                       <a:srgbClr val="000000"/>
                     </a:solidFill>
@@ -21797,7 +21899,7 @@
               </a:ln>
               <a:extLst>
                 <a:ext uri="{91240B29-F687-4f45-9708-019B960494DF}">
-                  <a14:hiddenLine xmlns:a14="http://schemas.microsoft.com/office/drawing/2010/main" xmlns="" w="9525">
+                  <a14:hiddenLine xmlns="" xmlns:a14="http://schemas.microsoft.com/office/drawing/2010/main" w="9525">
                     <a:solidFill>
                       <a:srgbClr val="000000"/>
                     </a:solidFill>
@@ -21859,7 +21961,7 @@
               </a:ln>
               <a:extLst>
                 <a:ext uri="{91240B29-F687-4f45-9708-019B960494DF}">
-                  <a14:hiddenLine xmlns:a14="http://schemas.microsoft.com/office/drawing/2010/main" xmlns="" w="9525">
+                  <a14:hiddenLine xmlns="" xmlns:a14="http://schemas.microsoft.com/office/drawing/2010/main" w="9525">
                     <a:solidFill>
                       <a:srgbClr val="000000"/>
                     </a:solidFill>
@@ -21969,7 +22071,7 @@
               </a:ln>
               <a:extLst>
                 <a:ext uri="{91240B29-F687-4f45-9708-019B960494DF}">
-                  <a14:hiddenLine xmlns:a14="http://schemas.microsoft.com/office/drawing/2010/main" xmlns="" w="9525">
+                  <a14:hiddenLine xmlns="" xmlns:a14="http://schemas.microsoft.com/office/drawing/2010/main" w="9525">
                     <a:solidFill>
                       <a:srgbClr val="000000"/>
                     </a:solidFill>
@@ -22053,7 +22155,7 @@
               </a:ln>
               <a:extLst>
                 <a:ext uri="{91240B29-F687-4f45-9708-019B960494DF}">
-                  <a14:hiddenLine xmlns:a14="http://schemas.microsoft.com/office/drawing/2010/main" xmlns="" w="9525">
+                  <a14:hiddenLine xmlns="" xmlns:a14="http://schemas.microsoft.com/office/drawing/2010/main" w="9525">
                     <a:solidFill>
                       <a:srgbClr val="000000"/>
                     </a:solidFill>
@@ -22115,7 +22217,7 @@
               </a:ln>
               <a:extLst>
                 <a:ext uri="{91240B29-F687-4f45-9708-019B960494DF}">
-                  <a14:hiddenLine xmlns:a14="http://schemas.microsoft.com/office/drawing/2010/main" xmlns="" w="9525">
+                  <a14:hiddenLine xmlns="" xmlns:a14="http://schemas.microsoft.com/office/drawing/2010/main" w="9525">
                     <a:solidFill>
                       <a:srgbClr val="000000"/>
                     </a:solidFill>
@@ -22177,7 +22279,7 @@
               </a:ln>
               <a:extLst>
                 <a:ext uri="{91240B29-F687-4f45-9708-019B960494DF}">
-                  <a14:hiddenLine xmlns:a14="http://schemas.microsoft.com/office/drawing/2010/main" xmlns="" w="9525">
+                  <a14:hiddenLine xmlns="" xmlns:a14="http://schemas.microsoft.com/office/drawing/2010/main" w="9525">
                     <a:solidFill>
                       <a:srgbClr val="000000"/>
                     </a:solidFill>
@@ -22267,7 +22369,7 @@
               </a:ln>
               <a:extLst>
                 <a:ext uri="{91240B29-F687-4f45-9708-019B960494DF}">
-                  <a14:hiddenLine xmlns:a14="http://schemas.microsoft.com/office/drawing/2010/main" xmlns="" w="9525">
+                  <a14:hiddenLine xmlns="" xmlns:a14="http://schemas.microsoft.com/office/drawing/2010/main" w="9525">
                     <a:solidFill>
                       <a:srgbClr val="000000"/>
                     </a:solidFill>
@@ -22301,7 +22403,7 @@
               </a:ln>
               <a:extLst>
                 <a:ext uri="{91240B29-F687-4f45-9708-019B960494DF}">
-                  <a14:hiddenLine xmlns:a14="http://schemas.microsoft.com/office/drawing/2010/main" xmlns="" w="9525">
+                  <a14:hiddenLine xmlns="" xmlns:a14="http://schemas.microsoft.com/office/drawing/2010/main" w="9525">
                     <a:solidFill>
                       <a:srgbClr val="000000"/>
                     </a:solidFill>
@@ -22366,7 +22468,7 @@
               </a:ln>
               <a:extLst>
                 <a:ext uri="{91240B29-F687-4f45-9708-019B960494DF}">
-                  <a14:hiddenLine xmlns:a14="http://schemas.microsoft.com/office/drawing/2010/main" xmlns="" w="9525">
+                  <a14:hiddenLine xmlns="" xmlns:a14="http://schemas.microsoft.com/office/drawing/2010/main" w="9525">
                     <a:solidFill>
                       <a:srgbClr val="000000"/>
                     </a:solidFill>
@@ -22456,7 +22558,7 @@
               </a:ln>
               <a:extLst>
                 <a:ext uri="{91240B29-F687-4f45-9708-019B960494DF}">
-                  <a14:hiddenLine xmlns:a14="http://schemas.microsoft.com/office/drawing/2010/main" xmlns="" w="9525">
+                  <a14:hiddenLine xmlns="" xmlns:a14="http://schemas.microsoft.com/office/drawing/2010/main" w="9525">
                     <a:solidFill>
                       <a:srgbClr val="000000"/>
                     </a:solidFill>
@@ -22518,7 +22620,7 @@
               </a:ln>
               <a:extLst>
                 <a:ext uri="{91240B29-F687-4f45-9708-019B960494DF}">
-                  <a14:hiddenLine xmlns:a14="http://schemas.microsoft.com/office/drawing/2010/main" xmlns="" w="9525">
+                  <a14:hiddenLine xmlns="" xmlns:a14="http://schemas.microsoft.com/office/drawing/2010/main" w="9525">
                     <a:solidFill>
                       <a:srgbClr val="000000"/>
                     </a:solidFill>
@@ -22608,7 +22710,7 @@
               </a:ln>
               <a:extLst>
                 <a:ext uri="{91240B29-F687-4f45-9708-019B960494DF}">
-                  <a14:hiddenLine xmlns:a14="http://schemas.microsoft.com/office/drawing/2010/main" xmlns="" w="9525">
+                  <a14:hiddenLine xmlns="" xmlns:a14="http://schemas.microsoft.com/office/drawing/2010/main" w="9525">
                     <a:solidFill>
                       <a:srgbClr val="000000"/>
                     </a:solidFill>
@@ -22673,7 +22775,7 @@
               </a:ln>
               <a:extLst>
                 <a:ext uri="{91240B29-F687-4f45-9708-019B960494DF}">
-                  <a14:hiddenLine xmlns:a14="http://schemas.microsoft.com/office/drawing/2010/main" xmlns="" w="9525">
+                  <a14:hiddenLine xmlns="" xmlns:a14="http://schemas.microsoft.com/office/drawing/2010/main" w="9525">
                     <a:solidFill>
                       <a:srgbClr val="000000"/>
                     </a:solidFill>
@@ -22735,7 +22837,7 @@
               </a:ln>
               <a:extLst>
                 <a:ext uri="{91240B29-F687-4f45-9708-019B960494DF}">
-                  <a14:hiddenLine xmlns:a14="http://schemas.microsoft.com/office/drawing/2010/main" xmlns="" w="9525">
+                  <a14:hiddenLine xmlns="" xmlns:a14="http://schemas.microsoft.com/office/drawing/2010/main" w="9525">
                     <a:solidFill>
                       <a:srgbClr val="000000"/>
                     </a:solidFill>
@@ -22825,7 +22927,7 @@
               </a:ln>
               <a:extLst>
                 <a:ext uri="{91240B29-F687-4f45-9708-019B960494DF}">
-                  <a14:hiddenLine xmlns:a14="http://schemas.microsoft.com/office/drawing/2010/main" xmlns="" w="9525">
+                  <a14:hiddenLine xmlns="" xmlns:a14="http://schemas.microsoft.com/office/drawing/2010/main" w="9525">
                     <a:solidFill>
                       <a:srgbClr val="000000"/>
                     </a:solidFill>
@@ -22915,7 +23017,7 @@
               </a:ln>
               <a:extLst>
                 <a:ext uri="{91240B29-F687-4f45-9708-019B960494DF}">
-                  <a14:hiddenLine xmlns:a14="http://schemas.microsoft.com/office/drawing/2010/main" xmlns="" w="9525">
+                  <a14:hiddenLine xmlns="" xmlns:a14="http://schemas.microsoft.com/office/drawing/2010/main" w="9525">
                     <a:solidFill>
                       <a:srgbClr val="000000"/>
                     </a:solidFill>
@@ -22980,7 +23082,7 @@
               </a:ln>
               <a:extLst>
                 <a:ext uri="{91240B29-F687-4f45-9708-019B960494DF}">
-                  <a14:hiddenLine xmlns:a14="http://schemas.microsoft.com/office/drawing/2010/main" xmlns="" w="9525">
+                  <a14:hiddenLine xmlns="" xmlns:a14="http://schemas.microsoft.com/office/drawing/2010/main" w="9525">
                     <a:solidFill>
                       <a:srgbClr val="000000"/>
                     </a:solidFill>
@@ -23100,7 +23202,7 @@
               </a:ln>
               <a:extLst>
                 <a:ext uri="{91240B29-F687-4f45-9708-019B960494DF}">
-                  <a14:hiddenLine xmlns:a14="http://schemas.microsoft.com/office/drawing/2010/main" xmlns="" w="9525">
+                  <a14:hiddenLine xmlns="" xmlns:a14="http://schemas.microsoft.com/office/drawing/2010/main" w="9525">
                     <a:solidFill>
                       <a:srgbClr val="000000"/>
                     </a:solidFill>
@@ -23198,7 +23300,7 @@
               </a:ln>
               <a:extLst>
                 <a:ext uri="{91240B29-F687-4f45-9708-019B960494DF}">
-                  <a14:hiddenLine xmlns:a14="http://schemas.microsoft.com/office/drawing/2010/main" xmlns="" w="9525">
+                  <a14:hiddenLine xmlns="" xmlns:a14="http://schemas.microsoft.com/office/drawing/2010/main" w="9525">
                     <a:solidFill>
                       <a:srgbClr val="000000"/>
                     </a:solidFill>
@@ -23313,7 +23415,7 @@
               </a:ln>
               <a:extLst>
                 <a:ext uri="{91240B29-F687-4f45-9708-019B960494DF}">
-                  <a14:hiddenLine xmlns:a14="http://schemas.microsoft.com/office/drawing/2010/main" xmlns="" w="9525">
+                  <a14:hiddenLine xmlns="" xmlns:a14="http://schemas.microsoft.com/office/drawing/2010/main" w="9525">
                     <a:solidFill>
                       <a:srgbClr val="000000"/>
                     </a:solidFill>
@@ -23403,7 +23505,7 @@
               </a:ln>
               <a:extLst>
                 <a:ext uri="{91240B29-F687-4f45-9708-019B960494DF}">
-                  <a14:hiddenLine xmlns:a14="http://schemas.microsoft.com/office/drawing/2010/main" xmlns="" w="9525">
+                  <a14:hiddenLine xmlns="" xmlns:a14="http://schemas.microsoft.com/office/drawing/2010/main" w="9525">
                     <a:solidFill>
                       <a:srgbClr val="000000"/>
                     </a:solidFill>
@@ -23468,7 +23570,7 @@
               </a:ln>
               <a:extLst>
                 <a:ext uri="{91240B29-F687-4f45-9708-019B960494DF}">
-                  <a14:hiddenLine xmlns:a14="http://schemas.microsoft.com/office/drawing/2010/main" xmlns="" w="9525">
+                  <a14:hiddenLine xmlns="" xmlns:a14="http://schemas.microsoft.com/office/drawing/2010/main" w="9525">
                     <a:solidFill>
                       <a:srgbClr val="000000"/>
                     </a:solidFill>
@@ -23558,7 +23660,7 @@
               </a:ln>
               <a:extLst>
                 <a:ext uri="{91240B29-F687-4f45-9708-019B960494DF}">
-                  <a14:hiddenLine xmlns:a14="http://schemas.microsoft.com/office/drawing/2010/main" xmlns="" w="9525">
+                  <a14:hiddenLine xmlns="" xmlns:a14="http://schemas.microsoft.com/office/drawing/2010/main" w="9525">
                     <a:solidFill>
                       <a:srgbClr val="000000"/>
                     </a:solidFill>
@@ -23626,7 +23728,7 @@
               </a:ln>
               <a:extLst>
                 <a:ext uri="{91240B29-F687-4f45-9708-019B960494DF}">
-                  <a14:hiddenLine xmlns:a14="http://schemas.microsoft.com/office/drawing/2010/main" xmlns="" w="9525">
+                  <a14:hiddenLine xmlns="" xmlns:a14="http://schemas.microsoft.com/office/drawing/2010/main" w="9525">
                     <a:solidFill>
                       <a:srgbClr val="000000"/>
                     </a:solidFill>
@@ -23716,7 +23818,7 @@
               </a:ln>
               <a:extLst>
                 <a:ext uri="{91240B29-F687-4f45-9708-019B960494DF}">
-                  <a14:hiddenLine xmlns:a14="http://schemas.microsoft.com/office/drawing/2010/main" xmlns="" w="9525">
+                  <a14:hiddenLine xmlns="" xmlns:a14="http://schemas.microsoft.com/office/drawing/2010/main" w="9525">
                     <a:solidFill>
                       <a:srgbClr val="000000"/>
                     </a:solidFill>
@@ -23784,7 +23886,7 @@
               </a:ln>
               <a:extLst>
                 <a:ext uri="{91240B29-F687-4f45-9708-019B960494DF}">
-                  <a14:hiddenLine xmlns:a14="http://schemas.microsoft.com/office/drawing/2010/main" xmlns="" w="9525">
+                  <a14:hiddenLine xmlns="" xmlns:a14="http://schemas.microsoft.com/office/drawing/2010/main" w="9525">
                     <a:solidFill>
                       <a:srgbClr val="000000"/>
                     </a:solidFill>
@@ -23874,7 +23976,7 @@
               </a:ln>
               <a:extLst>
                 <a:ext uri="{91240B29-F687-4f45-9708-019B960494DF}">
-                  <a14:hiddenLine xmlns:a14="http://schemas.microsoft.com/office/drawing/2010/main" xmlns="" w="9525">
+                  <a14:hiddenLine xmlns="" xmlns:a14="http://schemas.microsoft.com/office/drawing/2010/main" w="9525">
                     <a:solidFill>
                       <a:srgbClr val="000000"/>
                     </a:solidFill>
@@ -23908,7 +24010,7 @@
               </a:ln>
               <a:extLst>
                 <a:ext uri="{91240B29-F687-4f45-9708-019B960494DF}">
-                  <a14:hiddenLine xmlns:a14="http://schemas.microsoft.com/office/drawing/2010/main" xmlns="" w="9525">
+                  <a14:hiddenLine xmlns="" xmlns:a14="http://schemas.microsoft.com/office/drawing/2010/main" w="9525">
                     <a:solidFill>
                       <a:srgbClr val="000000"/>
                     </a:solidFill>
@@ -24048,7 +24150,7 @@
           <a:p>
             <a:fld id="{47BEED4F-3508-41C8-AA26-4F41CCA804E1}" type="datetimeFigureOut">
               <a:rPr lang="en-US" smtClean="0"/>
-              <a:t>11/23/2018</a:t>
+              <a:t>11/30/2018</a:t>
             </a:fld>
             <a:endParaRPr lang="en-US"/>
           </a:p>
@@ -25167,7 +25269,6 @@
               <a:rPr lang="fr-FR" sz="2000" dirty="0" smtClean="0"/>
               <a:t>Suffisant pour les besoins</a:t>
             </a:r>
-            <a:endParaRPr lang="fr-FR" sz="2000" dirty="0" smtClean="0"/>
           </a:p>
           <a:p>
             <a:pPr marL="342900" indent="-342900">
@@ -25457,42 +25558,6 @@
           </a:p>
         </p:txBody>
       </p:sp>
-      <p:pic>
-        <p:nvPicPr>
-          <p:cNvPr id="5" name="Picture 4"/>
-          <p:cNvPicPr>
-            <a:picLocks noChangeAspect="1"/>
-          </p:cNvPicPr>
-          <p:nvPr/>
-        </p:nvPicPr>
-        <p:blipFill>
-          <a:blip r:embed="rId2" cstate="print">
-            <a:extLst>
-              <a:ext uri="{28A0092B-C50C-407E-A947-70E740481C1C}">
-                <a14:useLocalDpi xmlns:a14="http://schemas.microsoft.com/office/drawing/2010/main" val="0"/>
-              </a:ext>
-            </a:extLst>
-          </a:blip>
-          <a:stretch>
-            <a:fillRect/>
-          </a:stretch>
-        </p:blipFill>
-        <p:spPr>
-          <a:xfrm>
-            <a:off x="1479722" y="1163917"/>
-            <a:ext cx="6454183" cy="5017143"/>
-          </a:xfrm>
-          <a:prstGeom prst="roundRect">
-            <a:avLst>
-              <a:gd name="adj" fmla="val 16667"/>
-            </a:avLst>
-          </a:prstGeom>
-          <a:ln>
-            <a:noFill/>
-          </a:ln>
-          <a:effectLst/>
-        </p:spPr>
-      </p:pic>
       <p:sp>
         <p:nvSpPr>
           <p:cNvPr id="6" name="TextBox 5"/>
@@ -25590,6 +25655,42 @@
           </a:p>
         </p:txBody>
       </p:sp>
+      <p:pic>
+        <p:nvPicPr>
+          <p:cNvPr id="7" name="Picture 6"/>
+          <p:cNvPicPr>
+            <a:picLocks noChangeAspect="1"/>
+          </p:cNvPicPr>
+          <p:nvPr/>
+        </p:nvPicPr>
+        <p:blipFill>
+          <a:blip r:embed="rId2">
+            <a:extLst>
+              <a:ext uri="{28A0092B-C50C-407E-A947-70E740481C1C}">
+                <a14:useLocalDpi xmlns:a14="http://schemas.microsoft.com/office/drawing/2010/main" val="0"/>
+              </a:ext>
+            </a:extLst>
+          </a:blip>
+          <a:stretch>
+            <a:fillRect/>
+          </a:stretch>
+        </p:blipFill>
+        <p:spPr>
+          <a:xfrm>
+            <a:off x="1196434" y="728229"/>
+            <a:ext cx="7249360" cy="5936339"/>
+          </a:xfrm>
+          <a:prstGeom prst="roundRect">
+            <a:avLst>
+              <a:gd name="adj" fmla="val 16667"/>
+            </a:avLst>
+          </a:prstGeom>
+          <a:ln>
+            <a:noFill/>
+          </a:ln>
+          <a:effectLst/>
+        </p:spPr>
+      </p:pic>
     </p:spTree>
     <p:extLst>
       <p:ext uri="{BB962C8B-B14F-4D97-AF65-F5344CB8AC3E}">
@@ -25624,7 +25725,7 @@
                             </p:stCondLst>
                             <p:childTnLst>
                               <p:par>
-                                <p:cTn id="5" presetID="2" presetClass="entr" presetSubtype="8" fill="hold" nodeType="clickEffect">
+                                <p:cTn id="5" presetID="2" presetClass="entr" presetSubtype="2" fill="hold" grpId="0" nodeType="clickEffect">
                                   <p:stCondLst>
                                     <p:cond delay="0"/>
                                   </p:stCondLst>
@@ -25637,7 +25738,7 @@
                                           </p:stCondLst>
                                         </p:cTn>
                                         <p:tgtEl>
-                                          <p:spTgt spid="5"/>
+                                          <p:spTgt spid="6"/>
                                         </p:tgtEl>
                                         <p:attrNameLst>
                                           <p:attrName>style.visibility</p:attrName>
@@ -25651,7 +25752,7 @@
                                       <p:cBhvr additive="base">
                                         <p:cTn id="7" dur="500" fill="hold"/>
                                         <p:tgtEl>
-                                          <p:spTgt spid="5"/>
+                                          <p:spTgt spid="6"/>
                                         </p:tgtEl>
                                         <p:attrNameLst>
                                           <p:attrName>ppt_x</p:attrName>
@@ -25660,7 +25761,7 @@
                                       <p:tavLst>
                                         <p:tav tm="0">
                                           <p:val>
-                                            <p:strVal val="0-#ppt_w/2"/>
+                                            <p:strVal val="1+#ppt_w/2"/>
                                           </p:val>
                                         </p:tav>
                                         <p:tav tm="100000">
@@ -25674,7 +25775,7 @@
                                       <p:cBhvr additive="base">
                                         <p:cTn id="8" dur="500" fill="hold"/>
                                         <p:tgtEl>
-                                          <p:spTgt spid="5"/>
+                                          <p:spTgt spid="6"/>
                                         </p:tgtEl>
                                         <p:attrNameLst>
                                           <p:attrName>ppt_y</p:attrName>
@@ -25715,7 +25816,7 @@
                             </p:stCondLst>
                             <p:childTnLst>
                               <p:par>
-                                <p:cTn id="11" presetID="2" presetClass="entr" presetSubtype="2" fill="hold" grpId="0" nodeType="clickEffect">
+                                <p:cTn id="11" presetID="2" presetClass="entr" presetSubtype="8" fill="hold" nodeType="clickEffect">
                                   <p:stCondLst>
                                     <p:cond delay="0"/>
                                   </p:stCondLst>
@@ -25728,7 +25829,7 @@
                                           </p:stCondLst>
                                         </p:cTn>
                                         <p:tgtEl>
-                                          <p:spTgt spid="6"/>
+                                          <p:spTgt spid="7"/>
                                         </p:tgtEl>
                                         <p:attrNameLst>
                                           <p:attrName>style.visibility</p:attrName>
@@ -25742,7 +25843,7 @@
                                       <p:cBhvr additive="base">
                                         <p:cTn id="13" dur="500" fill="hold"/>
                                         <p:tgtEl>
-                                          <p:spTgt spid="6"/>
+                                          <p:spTgt spid="7"/>
                                         </p:tgtEl>
                                         <p:attrNameLst>
                                           <p:attrName>ppt_x</p:attrName>
@@ -25751,7 +25852,7 @@
                                       <p:tavLst>
                                         <p:tav tm="0">
                                           <p:val>
-                                            <p:strVal val="1+#ppt_w/2"/>
+                                            <p:strVal val="0-#ppt_w/2"/>
                                           </p:val>
                                         </p:tav>
                                         <p:tav tm="100000">
@@ -25765,7 +25866,7 @@
                                       <p:cBhvr additive="base">
                                         <p:cTn id="14" dur="500" fill="hold"/>
                                         <p:tgtEl>
-                                          <p:spTgt spid="6"/>
+                                          <p:spTgt spid="7"/>
                                         </p:tgtEl>
                                         <p:attrNameLst>
                                           <p:attrName>ppt_y</p:attrName>
@@ -25863,227 +25964,6 @@
             <a:pPr algn="ctr"/>
             <a:r>
               <a:rPr lang="fr-FR" sz="2400" dirty="0" smtClean="0"/>
-              <a:t>10) Base de Données</a:t>
-            </a:r>
-            <a:endParaRPr lang="en-US" sz="2400" dirty="0"/>
-          </a:p>
-        </p:txBody>
-      </p:sp>
-      <p:pic>
-        <p:nvPicPr>
-          <p:cNvPr id="5" name="Picture 4"/>
-          <p:cNvPicPr>
-            <a:picLocks noChangeAspect="1"/>
-          </p:cNvPicPr>
-          <p:nvPr/>
-        </p:nvPicPr>
-        <p:blipFill>
-          <a:blip r:embed="rId2">
-            <a:extLst>
-              <a:ext uri="{28A0092B-C50C-407E-A947-70E740481C1C}">
-                <a14:useLocalDpi xmlns:a14="http://schemas.microsoft.com/office/drawing/2010/main" val="0"/>
-              </a:ext>
-            </a:extLst>
-          </a:blip>
-          <a:stretch>
-            <a:fillRect/>
-          </a:stretch>
-        </p:blipFill>
-        <p:spPr>
-          <a:xfrm>
-            <a:off x="2471319" y="754606"/>
-            <a:ext cx="7249360" cy="5936339"/>
-          </a:xfrm>
-          <a:prstGeom prst="roundRect">
-            <a:avLst>
-              <a:gd name="adj" fmla="val 16667"/>
-            </a:avLst>
-          </a:prstGeom>
-          <a:ln>
-            <a:noFill/>
-          </a:ln>
-          <a:effectLst/>
-        </p:spPr>
-      </p:pic>
-    </p:spTree>
-    <p:extLst>
-      <p:ext uri="{BB962C8B-B14F-4D97-AF65-F5344CB8AC3E}">
-        <p14:creationId xmlns:p14="http://schemas.microsoft.com/office/powerpoint/2010/main" val="3358291354"/>
-      </p:ext>
-    </p:extLst>
-  </p:cSld>
-  <p:clrMapOvr>
-    <a:masterClrMapping/>
-  </p:clrMapOvr>
-  <p:transition spd="slow">
-    <p:wipe/>
-  </p:transition>
-  <p:timing>
-    <p:tnLst>
-      <p:par>
-        <p:cTn id="1" dur="indefinite" restart="never" nodeType="tmRoot">
-          <p:childTnLst>
-            <p:seq concurrent="1" nextAc="seek">
-              <p:cTn id="2" dur="indefinite" nodeType="mainSeq">
-                <p:childTnLst>
-                  <p:par>
-                    <p:cTn id="3" fill="hold">
-                      <p:stCondLst>
-                        <p:cond delay="indefinite"/>
-                      </p:stCondLst>
-                      <p:childTnLst>
-                        <p:par>
-                          <p:cTn id="4" fill="hold">
-                            <p:stCondLst>
-                              <p:cond delay="0"/>
-                            </p:stCondLst>
-                            <p:childTnLst>
-                              <p:par>
-                                <p:cTn id="5" presetID="2" presetClass="entr" presetSubtype="8" fill="hold" nodeType="clickEffect">
-                                  <p:stCondLst>
-                                    <p:cond delay="0"/>
-                                  </p:stCondLst>
-                                  <p:childTnLst>
-                                    <p:set>
-                                      <p:cBhvr>
-                                        <p:cTn id="6" dur="1" fill="hold">
-                                          <p:stCondLst>
-                                            <p:cond delay="0"/>
-                                          </p:stCondLst>
-                                        </p:cTn>
-                                        <p:tgtEl>
-                                          <p:spTgt spid="5"/>
-                                        </p:tgtEl>
-                                        <p:attrNameLst>
-                                          <p:attrName>style.visibility</p:attrName>
-                                        </p:attrNameLst>
-                                      </p:cBhvr>
-                                      <p:to>
-                                        <p:strVal val="visible"/>
-                                      </p:to>
-                                    </p:set>
-                                    <p:anim calcmode="lin" valueType="num">
-                                      <p:cBhvr additive="base">
-                                        <p:cTn id="7" dur="500" fill="hold"/>
-                                        <p:tgtEl>
-                                          <p:spTgt spid="5"/>
-                                        </p:tgtEl>
-                                        <p:attrNameLst>
-                                          <p:attrName>ppt_x</p:attrName>
-                                        </p:attrNameLst>
-                                      </p:cBhvr>
-                                      <p:tavLst>
-                                        <p:tav tm="0">
-                                          <p:val>
-                                            <p:strVal val="0-#ppt_w/2"/>
-                                          </p:val>
-                                        </p:tav>
-                                        <p:tav tm="100000">
-                                          <p:val>
-                                            <p:strVal val="#ppt_x"/>
-                                          </p:val>
-                                        </p:tav>
-                                      </p:tavLst>
-                                    </p:anim>
-                                    <p:anim calcmode="lin" valueType="num">
-                                      <p:cBhvr additive="base">
-                                        <p:cTn id="8" dur="500" fill="hold"/>
-                                        <p:tgtEl>
-                                          <p:spTgt spid="5"/>
-                                        </p:tgtEl>
-                                        <p:attrNameLst>
-                                          <p:attrName>ppt_y</p:attrName>
-                                        </p:attrNameLst>
-                                      </p:cBhvr>
-                                      <p:tavLst>
-                                        <p:tav tm="0">
-                                          <p:val>
-                                            <p:strVal val="#ppt_y"/>
-                                          </p:val>
-                                        </p:tav>
-                                        <p:tav tm="100000">
-                                          <p:val>
-                                            <p:strVal val="#ppt_y"/>
-                                          </p:val>
-                                        </p:tav>
-                                      </p:tavLst>
-                                    </p:anim>
-                                  </p:childTnLst>
-                                </p:cTn>
-                              </p:par>
-                            </p:childTnLst>
-                          </p:cTn>
-                        </p:par>
-                      </p:childTnLst>
-                    </p:cTn>
-                  </p:par>
-                </p:childTnLst>
-              </p:cTn>
-              <p:prevCondLst>
-                <p:cond evt="onPrev" delay="0">
-                  <p:tgtEl>
-                    <p:sldTgt/>
-                  </p:tgtEl>
-                </p:cond>
-              </p:prevCondLst>
-              <p:nextCondLst>
-                <p:cond evt="onNext" delay="0">
-                  <p:tgtEl>
-                    <p:sldTgt/>
-                  </p:tgtEl>
-                </p:cond>
-              </p:nextCondLst>
-            </p:seq>
-          </p:childTnLst>
-        </p:cTn>
-      </p:par>
-    </p:tnLst>
-  </p:timing>
-</p:sld>
-</file>
-
-<file path=ppt/slides/slide14.xml><?xml version="1.0" encoding="utf-8"?>
-<p:sld xmlns:a="http://schemas.openxmlformats.org/drawingml/2006/main" xmlns:r="http://schemas.openxmlformats.org/officeDocument/2006/relationships" xmlns:p="http://schemas.openxmlformats.org/presentationml/2006/main">
-  <p:cSld>
-    <p:spTree>
-      <p:nvGrpSpPr>
-        <p:cNvPr id="1" name=""/>
-        <p:cNvGrpSpPr/>
-        <p:nvPr/>
-      </p:nvGrpSpPr>
-      <p:grpSpPr>
-        <a:xfrm>
-          <a:off x="0" y="0"/>
-          <a:ext cx="0" cy="0"/>
-          <a:chOff x="0" y="0"/>
-          <a:chExt cx="0" cy="0"/>
-        </a:xfrm>
-      </p:grpSpPr>
-      <p:sp>
-        <p:nvSpPr>
-          <p:cNvPr id="4" name="TextBox 3"/>
-          <p:cNvSpPr txBox="1"/>
-          <p:nvPr/>
-        </p:nvSpPr>
-        <p:spPr>
-          <a:xfrm>
-            <a:off x="0" y="175840"/>
-            <a:ext cx="12191999" cy="461665"/>
-          </a:xfrm>
-          <a:prstGeom prst="rect">
-            <a:avLst/>
-          </a:prstGeom>
-          <a:noFill/>
-        </p:spPr>
-        <p:txBody>
-          <a:bodyPr wrap="square" rtlCol="0">
-            <a:spAutoFit/>
-          </a:bodyPr>
-          <a:lstStyle/>
-          <a:p>
-            <a:pPr algn="ctr"/>
-            <a:r>
-              <a:rPr lang="fr-FR" sz="2400" dirty="0" smtClean="0"/>
               <a:t>Modifications / Evolutions futures</a:t>
             </a:r>
             <a:endParaRPr lang="en-US" sz="2400" dirty="0"/>
@@ -26097,7 +25977,7 @@
           <p:nvPr>
             <p:extLst>
               <p:ext uri="{D42A27DB-BD31-4B8C-83A1-F6EECF244321}">
-                <p14:modId xmlns:p14="http://schemas.microsoft.com/office/powerpoint/2010/main" val="1029140480"/>
+                <p14:modId xmlns:p14="http://schemas.microsoft.com/office/powerpoint/2010/main" val="2272807635"/>
               </p:ext>
             </p:extLst>
           </p:nvPr>
@@ -26843,7 +26723,7 @@
 </p:sld>
 </file>
 
-<file path=ppt/slides/slide15.xml><?xml version="1.0" encoding="utf-8"?>
+<file path=ppt/slides/slide14.xml><?xml version="1.0" encoding="utf-8"?>
 <p:sld xmlns:a="http://schemas.openxmlformats.org/drawingml/2006/main" xmlns:r="http://schemas.openxmlformats.org/officeDocument/2006/relationships" xmlns:p="http://schemas.openxmlformats.org/presentationml/2006/main">
   <p:cSld>
     <p:spTree>
@@ -29664,7 +29544,7 @@
         <p:spPr>
           <a:xfrm>
             <a:off x="8519746" y="852700"/>
-            <a:ext cx="2831123" cy="2862322"/>
+            <a:ext cx="2831123" cy="3785652"/>
           </a:xfrm>
           <a:prstGeom prst="rect">
             <a:avLst/>
@@ -29752,7 +29632,28 @@
             </a:pPr>
             <a:r>
               <a:rPr lang="fr-FR" sz="2000" dirty="0" smtClean="0"/>
-              <a:t>1 de la banque</a:t>
+              <a:t>1 de la </a:t>
+            </a:r>
+            <a:r>
+              <a:rPr lang="fr-FR" sz="2000" dirty="0" smtClean="0"/>
+              <a:t>banque</a:t>
+            </a:r>
+          </a:p>
+          <a:p>
+            <a:pPr marL="342900" indent="-342900">
+              <a:buFontTx/>
+              <a:buChar char="-"/>
+            </a:pPr>
+            <a:endParaRPr lang="fr-FR" sz="2000" dirty="0"/>
+          </a:p>
+          <a:p>
+            <a:r>
+              <a:rPr lang="fr-FR" sz="2000" dirty="0" smtClean="0"/>
+              <a:t>Empreinte bancaire, prél</a:t>
+            </a:r>
+            <a:r>
+              <a:rPr lang="fr-FR" sz="2000" dirty="0" smtClean="0"/>
+              <a:t>èvement à la livraison</a:t>
             </a:r>
             <a:endParaRPr lang="en-US" sz="2000" dirty="0"/>
           </a:p>
@@ -30060,7 +29961,7 @@
         <p:spPr>
           <a:xfrm>
             <a:off x="1334193" y="852700"/>
-            <a:ext cx="6745241" cy="5639578"/>
+            <a:ext cx="6745241" cy="5639577"/>
           </a:xfrm>
           <a:prstGeom prst="roundRect">
             <a:avLst>
@@ -30403,8 +30304,8 @@
         </p:blipFill>
         <p:spPr>
           <a:xfrm>
-            <a:off x="1479722" y="852700"/>
-            <a:ext cx="6454183" cy="5639578"/>
+            <a:off x="2635542" y="852700"/>
+            <a:ext cx="4142542" cy="5639578"/>
           </a:xfrm>
           <a:prstGeom prst="roundRect">
             <a:avLst>
@@ -30426,7 +30327,7 @@
         <p:spPr>
           <a:xfrm>
             <a:off x="8519746" y="852700"/>
-            <a:ext cx="2831123" cy="4401205"/>
+            <a:ext cx="2831123" cy="3477875"/>
           </a:xfrm>
           <a:prstGeom prst="rect">
             <a:avLst/>
@@ -30499,31 +30400,36 @@
             </a:r>
           </a:p>
           <a:p>
-            <a:endParaRPr lang="fr-FR" sz="2000" dirty="0" smtClean="0"/>
+            <a:pPr marL="342900" indent="-342900">
+              <a:buFontTx/>
+              <a:buChar char="-"/>
+            </a:pPr>
+            <a:endParaRPr lang="fr-FR" sz="2000" dirty="0"/>
           </a:p>
           <a:p>
             <a:r>
               <a:rPr lang="fr-FR" sz="2000" dirty="0" smtClean="0"/>
-              <a:t>L’admin (un serveur) va valider la commande</a:t>
+              <a:t>Recherche livreur</a:t>
             </a:r>
-          </a:p>
-          <a:p>
-            <a:endParaRPr lang="fr-FR" sz="2000" dirty="0" smtClean="0"/>
           </a:p>
           <a:p>
             <a:r>
               <a:rPr lang="fr-FR" sz="2000" dirty="0" smtClean="0"/>
-              <a:t>Ce contrôle manuel offre plus de souplesse pour les </a:t>
+              <a:t>Livraison</a:t>
             </a:r>
-            <a:r>
-              <a:rPr lang="fr-FR" sz="2000" dirty="0" err="1" smtClean="0"/>
-              <a:t>edge</a:t>
-            </a:r>
+          </a:p>
+          <a:p>
             <a:r>
               <a:rPr lang="fr-FR" sz="2000" dirty="0" smtClean="0"/>
-              <a:t> cases et l’évolution future de l’application</a:t>
+              <a:t>Paiement livreur</a:t>
             </a:r>
-            <a:endParaRPr lang="fr-FR" sz="2000" dirty="0"/>
+          </a:p>
+          <a:p>
+            <a:r>
+              <a:rPr lang="fr-FR" sz="2000" dirty="0" smtClean="0"/>
+              <a:t>Prélèvement client</a:t>
+            </a:r>
+            <a:endParaRPr lang="fr-FR" sz="2000" dirty="0" smtClean="0"/>
           </a:p>
         </p:txBody>
       </p:sp>

</xml_diff>

<commit_message>
modifications après session mentorat
</commit_message>
<xml_diff>
--- a/Présentation Soutenance.pptx
+++ b/Présentation Soutenance.pptx
@@ -3613,7 +3613,7 @@
         <a:lstStyle/>
         <a:p>
           <a:r>
-            <a:rPr lang="fr-FR" sz="2000" dirty="0" smtClean="0"/>
+            <a:rPr lang="fr-FR" sz="2400" dirty="0" smtClean="0"/>
             <a:t>Statistiques</a:t>
           </a:r>
           <a:endParaRPr lang="en-US" sz="2000" dirty="0"/>
@@ -6107,12 +6107,12 @@
         <a:fontRef idx="minor"/>
       </dsp:style>
       <dsp:txBody>
-        <a:bodyPr spcFirstLastPara="0" vert="horz" wrap="square" lIns="38100" tIns="38100" rIns="38100" bIns="38100" numCol="1" spcCol="1270" anchor="b" anchorCtr="0">
+        <a:bodyPr spcFirstLastPara="0" vert="horz" wrap="square" lIns="45720" tIns="45720" rIns="45720" bIns="45720" numCol="1" spcCol="1270" anchor="b" anchorCtr="0">
           <a:noAutofit/>
         </a:bodyPr>
         <a:lstStyle/>
         <a:p>
-          <a:pPr lvl="0" algn="l" defTabSz="889000">
+          <a:pPr lvl="0" algn="l" defTabSz="1066800">
             <a:lnSpc>
               <a:spcPct val="90000"/>
             </a:lnSpc>
@@ -6124,7 +6124,7 @@
             </a:spcAft>
           </a:pPr>
           <a:r>
-            <a:rPr lang="fr-FR" sz="2000" kern="1200" dirty="0" smtClean="0"/>
+            <a:rPr lang="fr-FR" sz="2400" kern="1200" dirty="0" smtClean="0"/>
             <a:t>Statistiques</a:t>
           </a:r>
           <a:endParaRPr lang="en-US" sz="2000" kern="1200" dirty="0"/>
@@ -12296,7 +12296,7 @@
           <a:noFill/>
           <a:extLst>
             <a:ext uri="{909E8E84-426E-40dd-AFC4-6F175D3DCCD1}">
-              <a14:hiddenFill xmlns="" xmlns:a14="http://schemas.microsoft.com/office/drawing/2010/main">
+              <a14:hiddenFill xmlns:a14="http://schemas.microsoft.com/office/drawing/2010/main" xmlns="">
                 <a:solidFill>
                   <a:srgbClr val="FFFFFF"/>
                 </a:solidFill>
@@ -12356,7 +12356,7 @@
             </a:ln>
             <a:extLst>
               <a:ext uri="{91240B29-F687-4f45-9708-019B960494DF}">
-                <a14:hiddenLine xmlns="" xmlns:a14="http://schemas.microsoft.com/office/drawing/2010/main" w="9525">
+                <a14:hiddenLine xmlns:a14="http://schemas.microsoft.com/office/drawing/2010/main" xmlns="" w="9525">
                   <a:solidFill>
                     <a:srgbClr val="000000"/>
                   </a:solidFill>
@@ -12446,7 +12446,7 @@
             </a:ln>
             <a:extLst>
               <a:ext uri="{91240B29-F687-4f45-9708-019B960494DF}">
-                <a14:hiddenLine xmlns="" xmlns:a14="http://schemas.microsoft.com/office/drawing/2010/main" w="9525">
+                <a14:hiddenLine xmlns:a14="http://schemas.microsoft.com/office/drawing/2010/main" xmlns="" w="9525">
                   <a:solidFill>
                     <a:srgbClr val="000000"/>
                   </a:solidFill>
@@ -12536,7 +12536,7 @@
             </a:ln>
             <a:extLst>
               <a:ext uri="{91240B29-F687-4f45-9708-019B960494DF}">
-                <a14:hiddenLine xmlns="" xmlns:a14="http://schemas.microsoft.com/office/drawing/2010/main" w="9525">
+                <a14:hiddenLine xmlns:a14="http://schemas.microsoft.com/office/drawing/2010/main" xmlns="" w="9525">
                   <a:solidFill>
                     <a:srgbClr val="000000"/>
                   </a:solidFill>
@@ -12570,7 +12570,7 @@
             </a:ln>
             <a:extLst>
               <a:ext uri="{91240B29-F687-4f45-9708-019B960494DF}">
-                <a14:hiddenLine xmlns="" xmlns:a14="http://schemas.microsoft.com/office/drawing/2010/main" w="9525">
+                <a14:hiddenLine xmlns:a14="http://schemas.microsoft.com/office/drawing/2010/main" xmlns="" w="9525">
                   <a:solidFill>
                     <a:srgbClr val="000000"/>
                   </a:solidFill>
@@ -12660,7 +12660,7 @@
             </a:ln>
             <a:extLst>
               <a:ext uri="{91240B29-F687-4f45-9708-019B960494DF}">
-                <a14:hiddenLine xmlns="" xmlns:a14="http://schemas.microsoft.com/office/drawing/2010/main" w="9525">
+                <a14:hiddenLine xmlns:a14="http://schemas.microsoft.com/office/drawing/2010/main" xmlns="" w="9525">
                   <a:solidFill>
                     <a:srgbClr val="000000"/>
                   </a:solidFill>
@@ -12722,7 +12722,7 @@
             </a:ln>
             <a:extLst>
               <a:ext uri="{91240B29-F687-4f45-9708-019B960494DF}">
-                <a14:hiddenLine xmlns="" xmlns:a14="http://schemas.microsoft.com/office/drawing/2010/main" w="9525">
+                <a14:hiddenLine xmlns:a14="http://schemas.microsoft.com/office/drawing/2010/main" xmlns="" w="9525">
                   <a:solidFill>
                     <a:srgbClr val="000000"/>
                   </a:solidFill>
@@ -12784,7 +12784,7 @@
             </a:ln>
             <a:extLst>
               <a:ext uri="{91240B29-F687-4f45-9708-019B960494DF}">
-                <a14:hiddenLine xmlns="" xmlns:a14="http://schemas.microsoft.com/office/drawing/2010/main" w="9525">
+                <a14:hiddenLine xmlns:a14="http://schemas.microsoft.com/office/drawing/2010/main" xmlns="" w="9525">
                   <a:solidFill>
                     <a:srgbClr val="000000"/>
                   </a:solidFill>
@@ -12874,7 +12874,7 @@
             </a:ln>
             <a:extLst>
               <a:ext uri="{91240B29-F687-4f45-9708-019B960494DF}">
-                <a14:hiddenLine xmlns="" xmlns:a14="http://schemas.microsoft.com/office/drawing/2010/main" w="9525">
+                <a14:hiddenLine xmlns:a14="http://schemas.microsoft.com/office/drawing/2010/main" xmlns="" w="9525">
                   <a:solidFill>
                     <a:srgbClr val="000000"/>
                   </a:solidFill>
@@ -12936,7 +12936,7 @@
             </a:ln>
             <a:extLst>
               <a:ext uri="{91240B29-F687-4f45-9708-019B960494DF}">
-                <a14:hiddenLine xmlns="" xmlns:a14="http://schemas.microsoft.com/office/drawing/2010/main" w="9525">
+                <a14:hiddenLine xmlns:a14="http://schemas.microsoft.com/office/drawing/2010/main" xmlns="" w="9525">
                   <a:solidFill>
                     <a:srgbClr val="000000"/>
                   </a:solidFill>
@@ -12998,7 +12998,7 @@
             </a:ln>
             <a:extLst>
               <a:ext uri="{91240B29-F687-4f45-9708-019B960494DF}">
-                <a14:hiddenLine xmlns="" xmlns:a14="http://schemas.microsoft.com/office/drawing/2010/main" w="9525">
+                <a14:hiddenLine xmlns:a14="http://schemas.microsoft.com/office/drawing/2010/main" xmlns="" w="9525">
                   <a:solidFill>
                     <a:srgbClr val="000000"/>
                   </a:solidFill>
@@ -13088,7 +13088,7 @@
             </a:ln>
             <a:extLst>
               <a:ext uri="{91240B29-F687-4f45-9708-019B960494DF}">
-                <a14:hiddenLine xmlns="" xmlns:a14="http://schemas.microsoft.com/office/drawing/2010/main" w="9525">
+                <a14:hiddenLine xmlns:a14="http://schemas.microsoft.com/office/drawing/2010/main" xmlns="" w="9525">
                   <a:solidFill>
                     <a:srgbClr val="000000"/>
                   </a:solidFill>
@@ -13178,7 +13178,7 @@
             </a:ln>
             <a:extLst>
               <a:ext uri="{91240B29-F687-4f45-9708-019B960494DF}">
-                <a14:hiddenLine xmlns="" xmlns:a14="http://schemas.microsoft.com/office/drawing/2010/main" w="9525">
+                <a14:hiddenLine xmlns:a14="http://schemas.microsoft.com/office/drawing/2010/main" xmlns="" w="9525">
                   <a:solidFill>
                     <a:srgbClr val="000000"/>
                   </a:solidFill>
@@ -13240,7 +13240,7 @@
             </a:ln>
             <a:extLst>
               <a:ext uri="{91240B29-F687-4f45-9708-019B960494DF}">
-                <a14:hiddenLine xmlns="" xmlns:a14="http://schemas.microsoft.com/office/drawing/2010/main" w="9525">
+                <a14:hiddenLine xmlns:a14="http://schemas.microsoft.com/office/drawing/2010/main" xmlns="" w="9525">
                   <a:solidFill>
                     <a:srgbClr val="000000"/>
                   </a:solidFill>
@@ -13350,7 +13350,7 @@
             </a:ln>
             <a:extLst>
               <a:ext uri="{91240B29-F687-4f45-9708-019B960494DF}">
-                <a14:hiddenLine xmlns="" xmlns:a14="http://schemas.microsoft.com/office/drawing/2010/main" w="9525">
+                <a14:hiddenLine xmlns:a14="http://schemas.microsoft.com/office/drawing/2010/main" xmlns="" w="9525">
                   <a:solidFill>
                     <a:srgbClr val="000000"/>
                   </a:solidFill>
@@ -13412,7 +13412,7 @@
             </a:ln>
             <a:extLst>
               <a:ext uri="{91240B29-F687-4f45-9708-019B960494DF}">
-                <a14:hiddenLine xmlns="" xmlns:a14="http://schemas.microsoft.com/office/drawing/2010/main" w="9525">
+                <a14:hiddenLine xmlns:a14="http://schemas.microsoft.com/office/drawing/2010/main" xmlns="" w="9525">
                   <a:solidFill>
                     <a:srgbClr val="000000"/>
                   </a:solidFill>
@@ -13502,7 +13502,7 @@
             </a:ln>
             <a:extLst>
               <a:ext uri="{91240B29-F687-4f45-9708-019B960494DF}">
-                <a14:hiddenLine xmlns="" xmlns:a14="http://schemas.microsoft.com/office/drawing/2010/main" w="9525">
+                <a14:hiddenLine xmlns:a14="http://schemas.microsoft.com/office/drawing/2010/main" xmlns="" w="9525">
                   <a:solidFill>
                     <a:srgbClr val="000000"/>
                   </a:solidFill>
@@ -13592,7 +13592,7 @@
             </a:ln>
             <a:extLst>
               <a:ext uri="{91240B29-F687-4f45-9708-019B960494DF}">
-                <a14:hiddenLine xmlns="" xmlns:a14="http://schemas.microsoft.com/office/drawing/2010/main" w="9525">
+                <a14:hiddenLine xmlns:a14="http://schemas.microsoft.com/office/drawing/2010/main" xmlns="" w="9525">
                   <a:solidFill>
                     <a:srgbClr val="000000"/>
                   </a:solidFill>
@@ -13654,7 +13654,7 @@
             </a:ln>
             <a:extLst>
               <a:ext uri="{91240B29-F687-4f45-9708-019B960494DF}">
-                <a14:hiddenLine xmlns="" xmlns:a14="http://schemas.microsoft.com/office/drawing/2010/main" w="9525">
+                <a14:hiddenLine xmlns:a14="http://schemas.microsoft.com/office/drawing/2010/main" xmlns="" w="9525">
                   <a:solidFill>
                     <a:srgbClr val="000000"/>
                   </a:solidFill>
@@ -13744,7 +13744,7 @@
             </a:ln>
             <a:extLst>
               <a:ext uri="{91240B29-F687-4f45-9708-019B960494DF}">
-                <a14:hiddenLine xmlns="" xmlns:a14="http://schemas.microsoft.com/office/drawing/2010/main" w="9525">
+                <a14:hiddenLine xmlns:a14="http://schemas.microsoft.com/office/drawing/2010/main" xmlns="" w="9525">
                   <a:solidFill>
                     <a:srgbClr val="000000"/>
                   </a:solidFill>
@@ -13834,7 +13834,7 @@
             </a:ln>
             <a:extLst>
               <a:ext uri="{91240B29-F687-4f45-9708-019B960494DF}">
-                <a14:hiddenLine xmlns="" xmlns:a14="http://schemas.microsoft.com/office/drawing/2010/main" w="9525">
+                <a14:hiddenLine xmlns:a14="http://schemas.microsoft.com/office/drawing/2010/main" xmlns="" w="9525">
                   <a:solidFill>
                     <a:srgbClr val="000000"/>
                   </a:solidFill>
@@ -13890,7 +13890,7 @@
             </a:ln>
             <a:extLst>
               <a:ext uri="{91240B29-F687-4f45-9708-019B960494DF}">
-                <a14:hiddenLine xmlns="" xmlns:a14="http://schemas.microsoft.com/office/drawing/2010/main" w="9525">
+                <a14:hiddenLine xmlns:a14="http://schemas.microsoft.com/office/drawing/2010/main" xmlns="" w="9525">
                   <a:solidFill>
                     <a:srgbClr val="000000"/>
                   </a:solidFill>
@@ -13980,7 +13980,7 @@
             </a:ln>
             <a:extLst>
               <a:ext uri="{91240B29-F687-4f45-9708-019B960494DF}">
-                <a14:hiddenLine xmlns="" xmlns:a14="http://schemas.microsoft.com/office/drawing/2010/main" w="9525">
+                <a14:hiddenLine xmlns:a14="http://schemas.microsoft.com/office/drawing/2010/main" xmlns="" w="9525">
                   <a:solidFill>
                     <a:srgbClr val="000000"/>
                   </a:solidFill>
@@ -14036,7 +14036,7 @@
             </a:ln>
             <a:extLst>
               <a:ext uri="{91240B29-F687-4f45-9708-019B960494DF}">
-                <a14:hiddenLine xmlns="" xmlns:a14="http://schemas.microsoft.com/office/drawing/2010/main" w="9525">
+                <a14:hiddenLine xmlns:a14="http://schemas.microsoft.com/office/drawing/2010/main" xmlns="" w="9525">
                   <a:solidFill>
                     <a:srgbClr val="000000"/>
                   </a:solidFill>
@@ -14126,7 +14126,7 @@
             </a:ln>
             <a:extLst>
               <a:ext uri="{91240B29-F687-4f45-9708-019B960494DF}">
-                <a14:hiddenLine xmlns="" xmlns:a14="http://schemas.microsoft.com/office/drawing/2010/main" w="9525">
+                <a14:hiddenLine xmlns:a14="http://schemas.microsoft.com/office/drawing/2010/main" xmlns="" w="9525">
                   <a:solidFill>
                     <a:srgbClr val="000000"/>
                   </a:solidFill>
@@ -14194,7 +14194,7 @@
             </a:ln>
             <a:extLst>
               <a:ext uri="{91240B29-F687-4f45-9708-019B960494DF}">
-                <a14:hiddenLine xmlns="" xmlns:a14="http://schemas.microsoft.com/office/drawing/2010/main" w="9525">
+                <a14:hiddenLine xmlns:a14="http://schemas.microsoft.com/office/drawing/2010/main" xmlns="" w="9525">
                   <a:solidFill>
                     <a:srgbClr val="000000"/>
                   </a:solidFill>
@@ -14284,7 +14284,7 @@
             </a:ln>
             <a:extLst>
               <a:ext uri="{91240B29-F687-4f45-9708-019B960494DF}">
-                <a14:hiddenLine xmlns="" xmlns:a14="http://schemas.microsoft.com/office/drawing/2010/main" w="9525">
+                <a14:hiddenLine xmlns:a14="http://schemas.microsoft.com/office/drawing/2010/main" xmlns="" w="9525">
                   <a:solidFill>
                     <a:srgbClr val="000000"/>
                   </a:solidFill>
@@ -14352,7 +14352,7 @@
             </a:ln>
             <a:extLst>
               <a:ext uri="{91240B29-F687-4f45-9708-019B960494DF}">
-                <a14:hiddenLine xmlns="" xmlns:a14="http://schemas.microsoft.com/office/drawing/2010/main" w="9525">
+                <a14:hiddenLine xmlns:a14="http://schemas.microsoft.com/office/drawing/2010/main" xmlns="" w="9525">
                   <a:solidFill>
                     <a:srgbClr val="000000"/>
                   </a:solidFill>
@@ -14442,7 +14442,7 @@
             </a:ln>
             <a:extLst>
               <a:ext uri="{91240B29-F687-4f45-9708-019B960494DF}">
-                <a14:hiddenLine xmlns="" xmlns:a14="http://schemas.microsoft.com/office/drawing/2010/main" w="9525">
+                <a14:hiddenLine xmlns:a14="http://schemas.microsoft.com/office/drawing/2010/main" xmlns="" w="9525">
                   <a:solidFill>
                     <a:srgbClr val="000000"/>
                   </a:solidFill>
@@ -14476,7 +14476,7 @@
             </a:ln>
             <a:extLst>
               <a:ext uri="{91240B29-F687-4f45-9708-019B960494DF}">
-                <a14:hiddenLine xmlns="" xmlns:a14="http://schemas.microsoft.com/office/drawing/2010/main" w="9525">
+                <a14:hiddenLine xmlns:a14="http://schemas.microsoft.com/office/drawing/2010/main" xmlns="" w="9525">
                   <a:solidFill>
                     <a:srgbClr val="000000"/>
                   </a:solidFill>
@@ -14566,7 +14566,7 @@
             </a:ln>
             <a:extLst>
               <a:ext uri="{91240B29-F687-4f45-9708-019B960494DF}">
-                <a14:hiddenLine xmlns="" xmlns:a14="http://schemas.microsoft.com/office/drawing/2010/main" w="9525">
+                <a14:hiddenLine xmlns:a14="http://schemas.microsoft.com/office/drawing/2010/main" xmlns="" w="9525">
                   <a:solidFill>
                     <a:srgbClr val="000000"/>
                   </a:solidFill>
@@ -14628,7 +14628,7 @@
             </a:ln>
             <a:extLst>
               <a:ext uri="{91240B29-F687-4f45-9708-019B960494DF}">
-                <a14:hiddenLine xmlns="" xmlns:a14="http://schemas.microsoft.com/office/drawing/2010/main" w="9525">
+                <a14:hiddenLine xmlns:a14="http://schemas.microsoft.com/office/drawing/2010/main" xmlns="" w="9525">
                   <a:solidFill>
                     <a:srgbClr val="000000"/>
                   </a:solidFill>
@@ -14690,7 +14690,7 @@
             </a:ln>
             <a:extLst>
               <a:ext uri="{91240B29-F687-4f45-9708-019B960494DF}">
-                <a14:hiddenLine xmlns="" xmlns:a14="http://schemas.microsoft.com/office/drawing/2010/main" w="9525">
+                <a14:hiddenLine xmlns:a14="http://schemas.microsoft.com/office/drawing/2010/main" xmlns="" w="9525">
                   <a:solidFill>
                     <a:srgbClr val="000000"/>
                   </a:solidFill>
@@ -14780,7 +14780,7 @@
             </a:ln>
             <a:extLst>
               <a:ext uri="{91240B29-F687-4f45-9708-019B960494DF}">
-                <a14:hiddenLine xmlns="" xmlns:a14="http://schemas.microsoft.com/office/drawing/2010/main" w="9525">
+                <a14:hiddenLine xmlns:a14="http://schemas.microsoft.com/office/drawing/2010/main" xmlns="" w="9525">
                   <a:solidFill>
                     <a:srgbClr val="000000"/>
                   </a:solidFill>
@@ -14848,7 +14848,7 @@
             </a:ln>
             <a:extLst>
               <a:ext uri="{91240B29-F687-4f45-9708-019B960494DF}">
-                <a14:hiddenLine xmlns="" xmlns:a14="http://schemas.microsoft.com/office/drawing/2010/main" w="9525">
+                <a14:hiddenLine xmlns:a14="http://schemas.microsoft.com/office/drawing/2010/main" xmlns="" w="9525">
                   <a:solidFill>
                     <a:srgbClr val="000000"/>
                   </a:solidFill>
@@ -14910,7 +14910,7 @@
             </a:ln>
             <a:extLst>
               <a:ext uri="{91240B29-F687-4f45-9708-019B960494DF}">
-                <a14:hiddenLine xmlns="" xmlns:a14="http://schemas.microsoft.com/office/drawing/2010/main" w="9525">
+                <a14:hiddenLine xmlns:a14="http://schemas.microsoft.com/office/drawing/2010/main" xmlns="" w="9525">
                   <a:solidFill>
                     <a:srgbClr val="000000"/>
                   </a:solidFill>
@@ -15000,7 +15000,7 @@
             </a:ln>
             <a:extLst>
               <a:ext uri="{91240B29-F687-4f45-9708-019B960494DF}">
-                <a14:hiddenLine xmlns="" xmlns:a14="http://schemas.microsoft.com/office/drawing/2010/main" w="9525">
+                <a14:hiddenLine xmlns:a14="http://schemas.microsoft.com/office/drawing/2010/main" xmlns="" w="9525">
                   <a:solidFill>
                     <a:srgbClr val="000000"/>
                   </a:solidFill>
@@ -15062,7 +15062,7 @@
             </a:ln>
             <a:extLst>
               <a:ext uri="{91240B29-F687-4f45-9708-019B960494DF}">
-                <a14:hiddenLine xmlns="" xmlns:a14="http://schemas.microsoft.com/office/drawing/2010/main" w="9525">
+                <a14:hiddenLine xmlns:a14="http://schemas.microsoft.com/office/drawing/2010/main" xmlns="" w="9525">
                   <a:solidFill>
                     <a:srgbClr val="000000"/>
                   </a:solidFill>
@@ -15152,7 +15152,7 @@
             </a:ln>
             <a:extLst>
               <a:ext uri="{91240B29-F687-4f45-9708-019B960494DF}">
-                <a14:hiddenLine xmlns="" xmlns:a14="http://schemas.microsoft.com/office/drawing/2010/main" w="9525">
+                <a14:hiddenLine xmlns:a14="http://schemas.microsoft.com/office/drawing/2010/main" xmlns="" w="9525">
                   <a:solidFill>
                     <a:srgbClr val="000000"/>
                   </a:solidFill>
@@ -15214,7 +15214,7 @@
             </a:ln>
             <a:extLst>
               <a:ext uri="{91240B29-F687-4f45-9708-019B960494DF}">
-                <a14:hiddenLine xmlns="" xmlns:a14="http://schemas.microsoft.com/office/drawing/2010/main" w="9525">
+                <a14:hiddenLine xmlns:a14="http://schemas.microsoft.com/office/drawing/2010/main" xmlns="" w="9525">
                   <a:solidFill>
                     <a:srgbClr val="000000"/>
                   </a:solidFill>
@@ -15304,7 +15304,7 @@
             </a:ln>
             <a:extLst>
               <a:ext uri="{91240B29-F687-4f45-9708-019B960494DF}">
-                <a14:hiddenLine xmlns="" xmlns:a14="http://schemas.microsoft.com/office/drawing/2010/main" w="9525">
+                <a14:hiddenLine xmlns:a14="http://schemas.microsoft.com/office/drawing/2010/main" xmlns="" w="9525">
                   <a:solidFill>
                     <a:srgbClr val="000000"/>
                   </a:solidFill>
@@ -15338,7 +15338,7 @@
             </a:ln>
             <a:extLst>
               <a:ext uri="{91240B29-F687-4f45-9708-019B960494DF}">
-                <a14:hiddenLine xmlns="" xmlns:a14="http://schemas.microsoft.com/office/drawing/2010/main" w="9525">
+                <a14:hiddenLine xmlns:a14="http://schemas.microsoft.com/office/drawing/2010/main" xmlns="" w="9525">
                   <a:solidFill>
                     <a:srgbClr val="000000"/>
                   </a:solidFill>
@@ -15403,7 +15403,7 @@
             </a:ln>
             <a:extLst>
               <a:ext uri="{91240B29-F687-4f45-9708-019B960494DF}">
-                <a14:hiddenLine xmlns="" xmlns:a14="http://schemas.microsoft.com/office/drawing/2010/main" w="9525">
+                <a14:hiddenLine xmlns:a14="http://schemas.microsoft.com/office/drawing/2010/main" xmlns="" w="9525">
                   <a:solidFill>
                     <a:srgbClr val="000000"/>
                   </a:solidFill>
@@ -15493,7 +15493,7 @@
             </a:ln>
             <a:extLst>
               <a:ext uri="{91240B29-F687-4f45-9708-019B960494DF}">
-                <a14:hiddenLine xmlns="" xmlns:a14="http://schemas.microsoft.com/office/drawing/2010/main" w="9525">
+                <a14:hiddenLine xmlns:a14="http://schemas.microsoft.com/office/drawing/2010/main" xmlns="" w="9525">
                   <a:solidFill>
                     <a:srgbClr val="000000"/>
                   </a:solidFill>
@@ -15555,7 +15555,7 @@
             </a:ln>
             <a:extLst>
               <a:ext uri="{91240B29-F687-4f45-9708-019B960494DF}">
-                <a14:hiddenLine xmlns="" xmlns:a14="http://schemas.microsoft.com/office/drawing/2010/main" w="9525">
+                <a14:hiddenLine xmlns:a14="http://schemas.microsoft.com/office/drawing/2010/main" xmlns="" w="9525">
                   <a:solidFill>
                     <a:srgbClr val="000000"/>
                   </a:solidFill>
@@ -15645,7 +15645,7 @@
             </a:ln>
             <a:extLst>
               <a:ext uri="{91240B29-F687-4f45-9708-019B960494DF}">
-                <a14:hiddenLine xmlns="" xmlns:a14="http://schemas.microsoft.com/office/drawing/2010/main" w="9525">
+                <a14:hiddenLine xmlns:a14="http://schemas.microsoft.com/office/drawing/2010/main" xmlns="" w="9525">
                   <a:solidFill>
                     <a:srgbClr val="000000"/>
                   </a:solidFill>
@@ -15735,7 +15735,7 @@
             </a:ln>
             <a:extLst>
               <a:ext uri="{91240B29-F687-4f45-9708-019B960494DF}">
-                <a14:hiddenLine xmlns="" xmlns:a14="http://schemas.microsoft.com/office/drawing/2010/main" w="9525">
+                <a14:hiddenLine xmlns:a14="http://schemas.microsoft.com/office/drawing/2010/main" xmlns="" w="9525">
                   <a:solidFill>
                     <a:srgbClr val="000000"/>
                   </a:solidFill>
@@ -15800,7 +15800,7 @@
             </a:ln>
             <a:extLst>
               <a:ext uri="{91240B29-F687-4f45-9708-019B960494DF}">
-                <a14:hiddenLine xmlns="" xmlns:a14="http://schemas.microsoft.com/office/drawing/2010/main" w="9525">
+                <a14:hiddenLine xmlns:a14="http://schemas.microsoft.com/office/drawing/2010/main" xmlns="" w="9525">
                   <a:solidFill>
                     <a:srgbClr val="000000"/>
                   </a:solidFill>
@@ -15862,7 +15862,7 @@
             </a:ln>
             <a:extLst>
               <a:ext uri="{91240B29-F687-4f45-9708-019B960494DF}">
-                <a14:hiddenLine xmlns="" xmlns:a14="http://schemas.microsoft.com/office/drawing/2010/main" w="9525">
+                <a14:hiddenLine xmlns:a14="http://schemas.microsoft.com/office/drawing/2010/main" xmlns="" w="9525">
                   <a:solidFill>
                     <a:srgbClr val="000000"/>
                   </a:solidFill>
@@ -15952,7 +15952,7 @@
             </a:ln>
             <a:extLst>
               <a:ext uri="{91240B29-F687-4f45-9708-019B960494DF}">
-                <a14:hiddenLine xmlns="" xmlns:a14="http://schemas.microsoft.com/office/drawing/2010/main" w="9525">
+                <a14:hiddenLine xmlns:a14="http://schemas.microsoft.com/office/drawing/2010/main" xmlns="" w="9525">
                   <a:solidFill>
                     <a:srgbClr val="000000"/>
                   </a:solidFill>
@@ -16042,7 +16042,7 @@
             </a:ln>
             <a:extLst>
               <a:ext uri="{91240B29-F687-4f45-9708-019B960494DF}">
-                <a14:hiddenLine xmlns="" xmlns:a14="http://schemas.microsoft.com/office/drawing/2010/main" w="9525">
+                <a14:hiddenLine xmlns:a14="http://schemas.microsoft.com/office/drawing/2010/main" xmlns="" w="9525">
                   <a:solidFill>
                     <a:srgbClr val="000000"/>
                   </a:solidFill>
@@ -16104,7 +16104,7 @@
             </a:ln>
             <a:extLst>
               <a:ext uri="{91240B29-F687-4f45-9708-019B960494DF}">
-                <a14:hiddenLine xmlns="" xmlns:a14="http://schemas.microsoft.com/office/drawing/2010/main" w="9525">
+                <a14:hiddenLine xmlns:a14="http://schemas.microsoft.com/office/drawing/2010/main" xmlns="" w="9525">
                   <a:solidFill>
                     <a:srgbClr val="000000"/>
                   </a:solidFill>
@@ -16224,7 +16224,7 @@
             </a:ln>
             <a:extLst>
               <a:ext uri="{91240B29-F687-4f45-9708-019B960494DF}">
-                <a14:hiddenLine xmlns="" xmlns:a14="http://schemas.microsoft.com/office/drawing/2010/main" w="9525">
+                <a14:hiddenLine xmlns:a14="http://schemas.microsoft.com/office/drawing/2010/main" xmlns="" w="9525">
                   <a:solidFill>
                     <a:srgbClr val="000000"/>
                   </a:solidFill>
@@ -16292,7 +16292,7 @@
             </a:ln>
             <a:extLst>
               <a:ext uri="{91240B29-F687-4f45-9708-019B960494DF}">
-                <a14:hiddenLine xmlns="" xmlns:a14="http://schemas.microsoft.com/office/drawing/2010/main" w="9525">
+                <a14:hiddenLine xmlns:a14="http://schemas.microsoft.com/office/drawing/2010/main" xmlns="" w="9525">
                   <a:solidFill>
                     <a:srgbClr val="000000"/>
                   </a:solidFill>
@@ -16382,7 +16382,7 @@
             </a:ln>
             <a:extLst>
               <a:ext uri="{91240B29-F687-4f45-9708-019B960494DF}">
-                <a14:hiddenLine xmlns="" xmlns:a14="http://schemas.microsoft.com/office/drawing/2010/main" w="9525">
+                <a14:hiddenLine xmlns:a14="http://schemas.microsoft.com/office/drawing/2010/main" xmlns="" w="9525">
                   <a:solidFill>
                     <a:srgbClr val="000000"/>
                   </a:solidFill>
@@ -21189,7 +21189,7 @@
           <a:noFill/>
           <a:extLst>
             <a:ext uri="{909E8E84-426E-40dd-AFC4-6F175D3DCCD1}">
-              <a14:hiddenFill xmlns="" xmlns:a14="http://schemas.microsoft.com/office/drawing/2010/main">
+              <a14:hiddenFill xmlns:a14="http://schemas.microsoft.com/office/drawing/2010/main" xmlns="">
                 <a:solidFill>
                   <a:srgbClr val="FFFFFF"/>
                 </a:solidFill>
@@ -21263,7 +21263,7 @@
               </a:ln>
               <a:extLst>
                 <a:ext uri="{91240B29-F687-4f45-9708-019B960494DF}">
-                  <a14:hiddenLine xmlns="" xmlns:a14="http://schemas.microsoft.com/office/drawing/2010/main" w="9525">
+                  <a14:hiddenLine xmlns:a14="http://schemas.microsoft.com/office/drawing/2010/main" xmlns="" w="9525">
                     <a:solidFill>
                       <a:srgbClr val="000000"/>
                     </a:solidFill>
@@ -21353,7 +21353,7 @@
               </a:ln>
               <a:extLst>
                 <a:ext uri="{91240B29-F687-4f45-9708-019B960494DF}">
-                  <a14:hiddenLine xmlns="" xmlns:a14="http://schemas.microsoft.com/office/drawing/2010/main" w="9525">
+                  <a14:hiddenLine xmlns:a14="http://schemas.microsoft.com/office/drawing/2010/main" xmlns="" w="9525">
                     <a:solidFill>
                       <a:srgbClr val="000000"/>
                     </a:solidFill>
@@ -21443,7 +21443,7 @@
               </a:ln>
               <a:extLst>
                 <a:ext uri="{91240B29-F687-4f45-9708-019B960494DF}">
-                  <a14:hiddenLine xmlns="" xmlns:a14="http://schemas.microsoft.com/office/drawing/2010/main" w="9525">
+                  <a14:hiddenLine xmlns:a14="http://schemas.microsoft.com/office/drawing/2010/main" xmlns="" w="9525">
                     <a:solidFill>
                       <a:srgbClr val="000000"/>
                     </a:solidFill>
@@ -21505,7 +21505,7 @@
               </a:ln>
               <a:extLst>
                 <a:ext uri="{91240B29-F687-4f45-9708-019B960494DF}">
-                  <a14:hiddenLine xmlns="" xmlns:a14="http://schemas.microsoft.com/office/drawing/2010/main" w="9525">
+                  <a14:hiddenLine xmlns:a14="http://schemas.microsoft.com/office/drawing/2010/main" xmlns="" w="9525">
                     <a:solidFill>
                       <a:srgbClr val="000000"/>
                     </a:solidFill>
@@ -21595,7 +21595,7 @@
               </a:ln>
               <a:extLst>
                 <a:ext uri="{91240B29-F687-4f45-9708-019B960494DF}">
-                  <a14:hiddenLine xmlns="" xmlns:a14="http://schemas.microsoft.com/office/drawing/2010/main" w="9525">
+                  <a14:hiddenLine xmlns:a14="http://schemas.microsoft.com/office/drawing/2010/main" xmlns="" w="9525">
                     <a:solidFill>
                       <a:srgbClr val="000000"/>
                     </a:solidFill>
@@ -21657,7 +21657,7 @@
               </a:ln>
               <a:extLst>
                 <a:ext uri="{91240B29-F687-4f45-9708-019B960494DF}">
-                  <a14:hiddenLine xmlns="" xmlns:a14="http://schemas.microsoft.com/office/drawing/2010/main" w="9525">
+                  <a14:hiddenLine xmlns:a14="http://schemas.microsoft.com/office/drawing/2010/main" xmlns="" w="9525">
                     <a:solidFill>
                       <a:srgbClr val="000000"/>
                     </a:solidFill>
@@ -21719,7 +21719,7 @@
               </a:ln>
               <a:extLst>
                 <a:ext uri="{91240B29-F687-4f45-9708-019B960494DF}">
-                  <a14:hiddenLine xmlns="" xmlns:a14="http://schemas.microsoft.com/office/drawing/2010/main" w="9525">
+                  <a14:hiddenLine xmlns:a14="http://schemas.microsoft.com/office/drawing/2010/main" xmlns="" w="9525">
                     <a:solidFill>
                       <a:srgbClr val="000000"/>
                     </a:solidFill>
@@ -21809,7 +21809,7 @@
               </a:ln>
               <a:extLst>
                 <a:ext uri="{91240B29-F687-4f45-9708-019B960494DF}">
-                  <a14:hiddenLine xmlns="" xmlns:a14="http://schemas.microsoft.com/office/drawing/2010/main" w="9525">
+                  <a14:hiddenLine xmlns:a14="http://schemas.microsoft.com/office/drawing/2010/main" xmlns="" w="9525">
                     <a:solidFill>
                       <a:srgbClr val="000000"/>
                     </a:solidFill>
@@ -21899,7 +21899,7 @@
               </a:ln>
               <a:extLst>
                 <a:ext uri="{91240B29-F687-4f45-9708-019B960494DF}">
-                  <a14:hiddenLine xmlns="" xmlns:a14="http://schemas.microsoft.com/office/drawing/2010/main" w="9525">
+                  <a14:hiddenLine xmlns:a14="http://schemas.microsoft.com/office/drawing/2010/main" xmlns="" w="9525">
                     <a:solidFill>
                       <a:srgbClr val="000000"/>
                     </a:solidFill>
@@ -21961,7 +21961,7 @@
               </a:ln>
               <a:extLst>
                 <a:ext uri="{91240B29-F687-4f45-9708-019B960494DF}">
-                  <a14:hiddenLine xmlns="" xmlns:a14="http://schemas.microsoft.com/office/drawing/2010/main" w="9525">
+                  <a14:hiddenLine xmlns:a14="http://schemas.microsoft.com/office/drawing/2010/main" xmlns="" w="9525">
                     <a:solidFill>
                       <a:srgbClr val="000000"/>
                     </a:solidFill>
@@ -22071,7 +22071,7 @@
               </a:ln>
               <a:extLst>
                 <a:ext uri="{91240B29-F687-4f45-9708-019B960494DF}">
-                  <a14:hiddenLine xmlns="" xmlns:a14="http://schemas.microsoft.com/office/drawing/2010/main" w="9525">
+                  <a14:hiddenLine xmlns:a14="http://schemas.microsoft.com/office/drawing/2010/main" xmlns="" w="9525">
                     <a:solidFill>
                       <a:srgbClr val="000000"/>
                     </a:solidFill>
@@ -22155,7 +22155,7 @@
               </a:ln>
               <a:extLst>
                 <a:ext uri="{91240B29-F687-4f45-9708-019B960494DF}">
-                  <a14:hiddenLine xmlns="" xmlns:a14="http://schemas.microsoft.com/office/drawing/2010/main" w="9525">
+                  <a14:hiddenLine xmlns:a14="http://schemas.microsoft.com/office/drawing/2010/main" xmlns="" w="9525">
                     <a:solidFill>
                       <a:srgbClr val="000000"/>
                     </a:solidFill>
@@ -22217,7 +22217,7 @@
               </a:ln>
               <a:extLst>
                 <a:ext uri="{91240B29-F687-4f45-9708-019B960494DF}">
-                  <a14:hiddenLine xmlns="" xmlns:a14="http://schemas.microsoft.com/office/drawing/2010/main" w="9525">
+                  <a14:hiddenLine xmlns:a14="http://schemas.microsoft.com/office/drawing/2010/main" xmlns="" w="9525">
                     <a:solidFill>
                       <a:srgbClr val="000000"/>
                     </a:solidFill>
@@ -22279,7 +22279,7 @@
               </a:ln>
               <a:extLst>
                 <a:ext uri="{91240B29-F687-4f45-9708-019B960494DF}">
-                  <a14:hiddenLine xmlns="" xmlns:a14="http://schemas.microsoft.com/office/drawing/2010/main" w="9525">
+                  <a14:hiddenLine xmlns:a14="http://schemas.microsoft.com/office/drawing/2010/main" xmlns="" w="9525">
                     <a:solidFill>
                       <a:srgbClr val="000000"/>
                     </a:solidFill>
@@ -22369,7 +22369,7 @@
               </a:ln>
               <a:extLst>
                 <a:ext uri="{91240B29-F687-4f45-9708-019B960494DF}">
-                  <a14:hiddenLine xmlns="" xmlns:a14="http://schemas.microsoft.com/office/drawing/2010/main" w="9525">
+                  <a14:hiddenLine xmlns:a14="http://schemas.microsoft.com/office/drawing/2010/main" xmlns="" w="9525">
                     <a:solidFill>
                       <a:srgbClr val="000000"/>
                     </a:solidFill>
@@ -22403,7 +22403,7 @@
               </a:ln>
               <a:extLst>
                 <a:ext uri="{91240B29-F687-4f45-9708-019B960494DF}">
-                  <a14:hiddenLine xmlns="" xmlns:a14="http://schemas.microsoft.com/office/drawing/2010/main" w="9525">
+                  <a14:hiddenLine xmlns:a14="http://schemas.microsoft.com/office/drawing/2010/main" xmlns="" w="9525">
                     <a:solidFill>
                       <a:srgbClr val="000000"/>
                     </a:solidFill>
@@ -22468,7 +22468,7 @@
               </a:ln>
               <a:extLst>
                 <a:ext uri="{91240B29-F687-4f45-9708-019B960494DF}">
-                  <a14:hiddenLine xmlns="" xmlns:a14="http://schemas.microsoft.com/office/drawing/2010/main" w="9525">
+                  <a14:hiddenLine xmlns:a14="http://schemas.microsoft.com/office/drawing/2010/main" xmlns="" w="9525">
                     <a:solidFill>
                       <a:srgbClr val="000000"/>
                     </a:solidFill>
@@ -22558,7 +22558,7 @@
               </a:ln>
               <a:extLst>
                 <a:ext uri="{91240B29-F687-4f45-9708-019B960494DF}">
-                  <a14:hiddenLine xmlns="" xmlns:a14="http://schemas.microsoft.com/office/drawing/2010/main" w="9525">
+                  <a14:hiddenLine xmlns:a14="http://schemas.microsoft.com/office/drawing/2010/main" xmlns="" w="9525">
                     <a:solidFill>
                       <a:srgbClr val="000000"/>
                     </a:solidFill>
@@ -22620,7 +22620,7 @@
               </a:ln>
               <a:extLst>
                 <a:ext uri="{91240B29-F687-4f45-9708-019B960494DF}">
-                  <a14:hiddenLine xmlns="" xmlns:a14="http://schemas.microsoft.com/office/drawing/2010/main" w="9525">
+                  <a14:hiddenLine xmlns:a14="http://schemas.microsoft.com/office/drawing/2010/main" xmlns="" w="9525">
                     <a:solidFill>
                       <a:srgbClr val="000000"/>
                     </a:solidFill>
@@ -22710,7 +22710,7 @@
               </a:ln>
               <a:extLst>
                 <a:ext uri="{91240B29-F687-4f45-9708-019B960494DF}">
-                  <a14:hiddenLine xmlns="" xmlns:a14="http://schemas.microsoft.com/office/drawing/2010/main" w="9525">
+                  <a14:hiddenLine xmlns:a14="http://schemas.microsoft.com/office/drawing/2010/main" xmlns="" w="9525">
                     <a:solidFill>
                       <a:srgbClr val="000000"/>
                     </a:solidFill>
@@ -22775,7 +22775,7 @@
               </a:ln>
               <a:extLst>
                 <a:ext uri="{91240B29-F687-4f45-9708-019B960494DF}">
-                  <a14:hiddenLine xmlns="" xmlns:a14="http://schemas.microsoft.com/office/drawing/2010/main" w="9525">
+                  <a14:hiddenLine xmlns:a14="http://schemas.microsoft.com/office/drawing/2010/main" xmlns="" w="9525">
                     <a:solidFill>
                       <a:srgbClr val="000000"/>
                     </a:solidFill>
@@ -22837,7 +22837,7 @@
               </a:ln>
               <a:extLst>
                 <a:ext uri="{91240B29-F687-4f45-9708-019B960494DF}">
-                  <a14:hiddenLine xmlns="" xmlns:a14="http://schemas.microsoft.com/office/drawing/2010/main" w="9525">
+                  <a14:hiddenLine xmlns:a14="http://schemas.microsoft.com/office/drawing/2010/main" xmlns="" w="9525">
                     <a:solidFill>
                       <a:srgbClr val="000000"/>
                     </a:solidFill>
@@ -22927,7 +22927,7 @@
               </a:ln>
               <a:extLst>
                 <a:ext uri="{91240B29-F687-4f45-9708-019B960494DF}">
-                  <a14:hiddenLine xmlns="" xmlns:a14="http://schemas.microsoft.com/office/drawing/2010/main" w="9525">
+                  <a14:hiddenLine xmlns:a14="http://schemas.microsoft.com/office/drawing/2010/main" xmlns="" w="9525">
                     <a:solidFill>
                       <a:srgbClr val="000000"/>
                     </a:solidFill>
@@ -23017,7 +23017,7 @@
               </a:ln>
               <a:extLst>
                 <a:ext uri="{91240B29-F687-4f45-9708-019B960494DF}">
-                  <a14:hiddenLine xmlns="" xmlns:a14="http://schemas.microsoft.com/office/drawing/2010/main" w="9525">
+                  <a14:hiddenLine xmlns:a14="http://schemas.microsoft.com/office/drawing/2010/main" xmlns="" w="9525">
                     <a:solidFill>
                       <a:srgbClr val="000000"/>
                     </a:solidFill>
@@ -23082,7 +23082,7 @@
               </a:ln>
               <a:extLst>
                 <a:ext uri="{91240B29-F687-4f45-9708-019B960494DF}">
-                  <a14:hiddenLine xmlns="" xmlns:a14="http://schemas.microsoft.com/office/drawing/2010/main" w="9525">
+                  <a14:hiddenLine xmlns:a14="http://schemas.microsoft.com/office/drawing/2010/main" xmlns="" w="9525">
                     <a:solidFill>
                       <a:srgbClr val="000000"/>
                     </a:solidFill>
@@ -23202,7 +23202,7 @@
               </a:ln>
               <a:extLst>
                 <a:ext uri="{91240B29-F687-4f45-9708-019B960494DF}">
-                  <a14:hiddenLine xmlns="" xmlns:a14="http://schemas.microsoft.com/office/drawing/2010/main" w="9525">
+                  <a14:hiddenLine xmlns:a14="http://schemas.microsoft.com/office/drawing/2010/main" xmlns="" w="9525">
                     <a:solidFill>
                       <a:srgbClr val="000000"/>
                     </a:solidFill>
@@ -23300,7 +23300,7 @@
               </a:ln>
               <a:extLst>
                 <a:ext uri="{91240B29-F687-4f45-9708-019B960494DF}">
-                  <a14:hiddenLine xmlns="" xmlns:a14="http://schemas.microsoft.com/office/drawing/2010/main" w="9525">
+                  <a14:hiddenLine xmlns:a14="http://schemas.microsoft.com/office/drawing/2010/main" xmlns="" w="9525">
                     <a:solidFill>
                       <a:srgbClr val="000000"/>
                     </a:solidFill>
@@ -23415,7 +23415,7 @@
               </a:ln>
               <a:extLst>
                 <a:ext uri="{91240B29-F687-4f45-9708-019B960494DF}">
-                  <a14:hiddenLine xmlns="" xmlns:a14="http://schemas.microsoft.com/office/drawing/2010/main" w="9525">
+                  <a14:hiddenLine xmlns:a14="http://schemas.microsoft.com/office/drawing/2010/main" xmlns="" w="9525">
                     <a:solidFill>
                       <a:srgbClr val="000000"/>
                     </a:solidFill>
@@ -23505,7 +23505,7 @@
               </a:ln>
               <a:extLst>
                 <a:ext uri="{91240B29-F687-4f45-9708-019B960494DF}">
-                  <a14:hiddenLine xmlns="" xmlns:a14="http://schemas.microsoft.com/office/drawing/2010/main" w="9525">
+                  <a14:hiddenLine xmlns:a14="http://schemas.microsoft.com/office/drawing/2010/main" xmlns="" w="9525">
                     <a:solidFill>
                       <a:srgbClr val="000000"/>
                     </a:solidFill>
@@ -23570,7 +23570,7 @@
               </a:ln>
               <a:extLst>
                 <a:ext uri="{91240B29-F687-4f45-9708-019B960494DF}">
-                  <a14:hiddenLine xmlns="" xmlns:a14="http://schemas.microsoft.com/office/drawing/2010/main" w="9525">
+                  <a14:hiddenLine xmlns:a14="http://schemas.microsoft.com/office/drawing/2010/main" xmlns="" w="9525">
                     <a:solidFill>
                       <a:srgbClr val="000000"/>
                     </a:solidFill>
@@ -23660,7 +23660,7 @@
               </a:ln>
               <a:extLst>
                 <a:ext uri="{91240B29-F687-4f45-9708-019B960494DF}">
-                  <a14:hiddenLine xmlns="" xmlns:a14="http://schemas.microsoft.com/office/drawing/2010/main" w="9525">
+                  <a14:hiddenLine xmlns:a14="http://schemas.microsoft.com/office/drawing/2010/main" xmlns="" w="9525">
                     <a:solidFill>
                       <a:srgbClr val="000000"/>
                     </a:solidFill>
@@ -23728,7 +23728,7 @@
               </a:ln>
               <a:extLst>
                 <a:ext uri="{91240B29-F687-4f45-9708-019B960494DF}">
-                  <a14:hiddenLine xmlns="" xmlns:a14="http://schemas.microsoft.com/office/drawing/2010/main" w="9525">
+                  <a14:hiddenLine xmlns:a14="http://schemas.microsoft.com/office/drawing/2010/main" xmlns="" w="9525">
                     <a:solidFill>
                       <a:srgbClr val="000000"/>
                     </a:solidFill>
@@ -23818,7 +23818,7 @@
               </a:ln>
               <a:extLst>
                 <a:ext uri="{91240B29-F687-4f45-9708-019B960494DF}">
-                  <a14:hiddenLine xmlns="" xmlns:a14="http://schemas.microsoft.com/office/drawing/2010/main" w="9525">
+                  <a14:hiddenLine xmlns:a14="http://schemas.microsoft.com/office/drawing/2010/main" xmlns="" w="9525">
                     <a:solidFill>
                       <a:srgbClr val="000000"/>
                     </a:solidFill>
@@ -23886,7 +23886,7 @@
               </a:ln>
               <a:extLst>
                 <a:ext uri="{91240B29-F687-4f45-9708-019B960494DF}">
-                  <a14:hiddenLine xmlns="" xmlns:a14="http://schemas.microsoft.com/office/drawing/2010/main" w="9525">
+                  <a14:hiddenLine xmlns:a14="http://schemas.microsoft.com/office/drawing/2010/main" xmlns="" w="9525">
                     <a:solidFill>
                       <a:srgbClr val="000000"/>
                     </a:solidFill>
@@ -23976,7 +23976,7 @@
               </a:ln>
               <a:extLst>
                 <a:ext uri="{91240B29-F687-4f45-9708-019B960494DF}">
-                  <a14:hiddenLine xmlns="" xmlns:a14="http://schemas.microsoft.com/office/drawing/2010/main" w="9525">
+                  <a14:hiddenLine xmlns:a14="http://schemas.microsoft.com/office/drawing/2010/main" xmlns="" w="9525">
                     <a:solidFill>
                       <a:srgbClr val="000000"/>
                     </a:solidFill>
@@ -24010,7 +24010,7 @@
               </a:ln>
               <a:extLst>
                 <a:ext uri="{91240B29-F687-4f45-9708-019B960494DF}">
-                  <a14:hiddenLine xmlns="" xmlns:a14="http://schemas.microsoft.com/office/drawing/2010/main" w="9525">
+                  <a14:hiddenLine xmlns:a14="http://schemas.microsoft.com/office/drawing/2010/main" xmlns="" w="9525">
                     <a:solidFill>
                       <a:srgbClr val="000000"/>
                     </a:solidFill>
@@ -24758,7 +24758,7 @@
         <p:spPr>
           <a:xfrm>
             <a:off x="1479722" y="999513"/>
-            <a:ext cx="6454183" cy="5345952"/>
+            <a:ext cx="6454182" cy="5345952"/>
           </a:xfrm>
           <a:prstGeom prst="roundRect">
             <a:avLst>
@@ -24780,7 +24780,7 @@
         <p:spPr>
           <a:xfrm>
             <a:off x="8519746" y="852700"/>
-            <a:ext cx="3015762" cy="4093428"/>
+            <a:ext cx="3015762" cy="4401205"/>
           </a:xfrm>
           <a:prstGeom prst="rect">
             <a:avLst/>
@@ -24858,26 +24858,6 @@
           <a:p>
             <a:r>
               <a:rPr lang="fr-FR" sz="2000" b="1" dirty="0" smtClean="0"/>
-              <a:t>1 classe d’association:</a:t>
-            </a:r>
-          </a:p>
-          <a:p>
-            <a:pPr marL="342900" indent="-342900">
-              <a:buFontTx/>
-              <a:buChar char="-"/>
-            </a:pPr>
-            <a:r>
-              <a:rPr lang="fr-FR" sz="2000" dirty="0" err="1" smtClean="0"/>
-              <a:t>ProduitsDansCommande</a:t>
-            </a:r>
-            <a:endParaRPr lang="fr-FR" sz="2000" dirty="0" smtClean="0"/>
-          </a:p>
-          <a:p>
-            <a:endParaRPr lang="fr-FR" sz="2000" dirty="0" smtClean="0"/>
-          </a:p>
-          <a:p>
-            <a:r>
-              <a:rPr lang="fr-FR" sz="2000" b="1" dirty="0" smtClean="0"/>
               <a:t>2 classes filles:</a:t>
             </a:r>
           </a:p>
@@ -24900,7 +24880,20 @@
               <a:rPr lang="fr-FR" sz="2000" dirty="0" smtClean="0"/>
               <a:t>Plat</a:t>
             </a:r>
+          </a:p>
+          <a:p>
+            <a:pPr marL="342900" indent="-342900">
+              <a:buFontTx/>
+              <a:buChar char="-"/>
+            </a:pPr>
             <a:endParaRPr lang="fr-FR" sz="2000" dirty="0"/>
+          </a:p>
+          <a:p>
+            <a:r>
+              <a:rPr lang="fr-FR" sz="2000" dirty="0" smtClean="0"/>
+              <a:t>Champ ingrédient : peut servir à intégrer une description du produit</a:t>
+            </a:r>
+            <a:endParaRPr lang="fr-FR" sz="2000" dirty="0" smtClean="0"/>
           </a:p>
         </p:txBody>
       </p:sp>
@@ -25210,7 +25203,7 @@
         <p:spPr>
           <a:xfrm>
             <a:off x="1479722" y="1163917"/>
-            <a:ext cx="6454183" cy="5017143"/>
+            <a:ext cx="6454182" cy="5017143"/>
           </a:xfrm>
           <a:prstGeom prst="roundRect">
             <a:avLst>
@@ -25232,7 +25225,7 @@
         <p:spPr>
           <a:xfrm>
             <a:off x="8379068" y="2364977"/>
-            <a:ext cx="3323494" cy="1631216"/>
+            <a:ext cx="3323494" cy="1323439"/>
           </a:xfrm>
           <a:prstGeom prst="rect">
             <a:avLst/>
@@ -25257,25 +25250,8 @@
             </a:pPr>
             <a:r>
               <a:rPr lang="fr-FR" sz="2000" dirty="0" smtClean="0"/>
-              <a:t>Développement plus rapide</a:t>
+              <a:t>Informations fixes dans le temps</a:t>
             </a:r>
-          </a:p>
-          <a:p>
-            <a:pPr marL="342900" indent="-342900">
-              <a:buFontTx/>
-              <a:buChar char="-"/>
-            </a:pPr>
-            <a:r>
-              <a:rPr lang="fr-FR" sz="2000" dirty="0" smtClean="0"/>
-              <a:t>Suffisant pour les besoins</a:t>
-            </a:r>
-          </a:p>
-          <a:p>
-            <a:pPr marL="342900" indent="-342900">
-              <a:buFontTx/>
-              <a:buChar char="-"/>
-            </a:pPr>
-            <a:endParaRPr lang="fr-FR" sz="2000" dirty="0"/>
           </a:p>
         </p:txBody>
       </p:sp>
@@ -25977,7 +25953,7 @@
           <p:nvPr>
             <p:extLst>
               <p:ext uri="{D42A27DB-BD31-4B8C-83A1-F6EECF244321}">
-                <p14:modId xmlns:p14="http://schemas.microsoft.com/office/powerpoint/2010/main" val="2272807635"/>
+                <p14:modId xmlns:p14="http://schemas.microsoft.com/office/powerpoint/2010/main" val="1542481491"/>
               </p:ext>
             </p:extLst>
           </p:nvPr>
@@ -29632,11 +29608,7 @@
             </a:pPr>
             <a:r>
               <a:rPr lang="fr-FR" sz="2000" dirty="0" smtClean="0"/>
-              <a:t>1 de la </a:t>
-            </a:r>
-            <a:r>
-              <a:rPr lang="fr-FR" sz="2000" dirty="0" smtClean="0"/>
-              <a:t>banque</a:t>
+              <a:t>1 de la banque</a:t>
             </a:r>
           </a:p>
           <a:p>
@@ -29649,11 +29621,7 @@
           <a:p>
             <a:r>
               <a:rPr lang="fr-FR" sz="2000" dirty="0" smtClean="0"/>
-              <a:t>Empreinte bancaire, prél</a:t>
-            </a:r>
-            <a:r>
-              <a:rPr lang="fr-FR" sz="2000" dirty="0" smtClean="0"/>
-              <a:t>èvement à la livraison</a:t>
+              <a:t>Empreinte bancaire, prélèvement à la livraison</a:t>
             </a:r>
             <a:endParaRPr lang="en-US" sz="2000" dirty="0"/>
           </a:p>
@@ -30429,7 +30397,6 @@
               <a:rPr lang="fr-FR" sz="2000" dirty="0" smtClean="0"/>
               <a:t>Prélèvement client</a:t>
             </a:r>
-            <a:endParaRPr lang="fr-FR" sz="2000" dirty="0" smtClean="0"/>
           </a:p>
         </p:txBody>
       </p:sp>

</xml_diff>